<commit_message>
TW edits for bullets and diagram
</commit_message>
<xml_diff>
--- a/docs/deployment_guide/images/freeradius-mfa-workspaces-architecture-diagram.pptx
+++ b/docs/deployment_guide/images/freeradius-mfa-workspaces-architecture-diagram.pptx
@@ -12107,7 +12107,7 @@
           <a:lstStyle/>
           <a:p>
             <a:pPr algn="ctr"/>
-            <a:endParaRPr lang="en-US"/>
+            <a:endParaRPr lang="en-US" dirty="0"/>
           </a:p>
         </p:txBody>
       </p:sp>
@@ -16367,10 +16367,10 @@
       </p:sp>
       <p:sp>
         <p:nvSpPr>
-          <p:cNvPr id="78" name="TextBox 12">
-            <a:extLst>
-              <a:ext uri="{FF2B5EF4-FFF2-40B4-BE49-F238E27FC236}">
-                <a16:creationId xmlns:a16="http://schemas.microsoft.com/office/drawing/2014/main" id="{FD1D5076-2EB7-AC48-9BB5-DF7900D47544}"/>
+          <p:cNvPr id="81" name="TextBox 20">
+            <a:extLst>
+              <a:ext uri="{FF2B5EF4-FFF2-40B4-BE49-F238E27FC236}">
+                <a16:creationId xmlns:a16="http://schemas.microsoft.com/office/drawing/2014/main" id="{13BF09F2-646B-274B-A7A2-004C0C856F64}"/>
               </a:ext>
             </a:extLst>
           </p:cNvPr>
@@ -16381,169 +16381,8 @@
         </p:nvSpPr>
         <p:spPr bwMode="auto">
           <a:xfrm>
-            <a:off x="4830028" y="1133932"/>
-            <a:ext cx="1403350" cy="276999"/>
-          </a:xfrm>
-          <a:prstGeom prst="rect">
-            <a:avLst/>
-          </a:prstGeom>
-          <a:noFill/>
-          <a:ln>
-            <a:noFill/>
-          </a:ln>
-          <a:extLst>
-            <a:ext uri="{909E8E84-426E-40DD-AFC4-6F175D3DCCD1}">
-              <a14:hiddenFill xmlns:a14="http://schemas.microsoft.com/office/drawing/2010/main">
-                <a:solidFill>
-                  <a:srgbClr val="FFFFFF"/>
-                </a:solidFill>
-              </a14:hiddenFill>
-            </a:ext>
-            <a:ext uri="{91240B29-F687-4F45-9708-019B960494DF}">
-              <a14:hiddenLine xmlns:a14="http://schemas.microsoft.com/office/drawing/2010/main" w="9525">
-                <a:solidFill>
-                  <a:srgbClr val="000000"/>
-                </a:solidFill>
-                <a:miter lim="800000"/>
-                <a:headEnd/>
-                <a:tailEnd/>
-              </a14:hiddenLine>
-            </a:ext>
-          </a:extLst>
-        </p:spPr>
-        <p:txBody>
-          <a:bodyPr>
-            <a:spAutoFit/>
-          </a:bodyPr>
-          <a:lstStyle>
-            <a:lvl1pPr>
-              <a:defRPr>
-                <a:solidFill>
-                  <a:schemeClr val="tx1"/>
-                </a:solidFill>
-                <a:latin typeface="Calibri" panose="020F0502020204030204" pitchFamily="34" charset="0"/>
-              </a:defRPr>
-            </a:lvl1pPr>
-            <a:lvl2pPr marL="742950" indent="-285750">
-              <a:defRPr>
-                <a:solidFill>
-                  <a:schemeClr val="tx1"/>
-                </a:solidFill>
-                <a:latin typeface="Calibri" panose="020F0502020204030204" pitchFamily="34" charset="0"/>
-              </a:defRPr>
-            </a:lvl2pPr>
-            <a:lvl3pPr marL="1143000" indent="-228600">
-              <a:defRPr>
-                <a:solidFill>
-                  <a:schemeClr val="tx1"/>
-                </a:solidFill>
-                <a:latin typeface="Calibri" panose="020F0502020204030204" pitchFamily="34" charset="0"/>
-              </a:defRPr>
-            </a:lvl3pPr>
-            <a:lvl4pPr marL="1600200" indent="-228600">
-              <a:defRPr>
-                <a:solidFill>
-                  <a:schemeClr val="tx1"/>
-                </a:solidFill>
-                <a:latin typeface="Calibri" panose="020F0502020204030204" pitchFamily="34" charset="0"/>
-              </a:defRPr>
-            </a:lvl4pPr>
-            <a:lvl5pPr marL="2057400" indent="-228600">
-              <a:defRPr>
-                <a:solidFill>
-                  <a:schemeClr val="tx1"/>
-                </a:solidFill>
-                <a:latin typeface="Calibri" panose="020F0502020204030204" pitchFamily="34" charset="0"/>
-              </a:defRPr>
-            </a:lvl5pPr>
-            <a:lvl6pPr marL="2514600" indent="-228600" eaLnBrk="0" fontAlgn="base" hangingPunct="0">
-              <a:spcBef>
-                <a:spcPct val="0"/>
-              </a:spcBef>
-              <a:spcAft>
-                <a:spcPct val="0"/>
-              </a:spcAft>
-              <a:defRPr>
-                <a:solidFill>
-                  <a:schemeClr val="tx1"/>
-                </a:solidFill>
-                <a:latin typeface="Calibri" panose="020F0502020204030204" pitchFamily="34" charset="0"/>
-              </a:defRPr>
-            </a:lvl6pPr>
-            <a:lvl7pPr marL="2971800" indent="-228600" eaLnBrk="0" fontAlgn="base" hangingPunct="0">
-              <a:spcBef>
-                <a:spcPct val="0"/>
-              </a:spcBef>
-              <a:spcAft>
-                <a:spcPct val="0"/>
-              </a:spcAft>
-              <a:defRPr>
-                <a:solidFill>
-                  <a:schemeClr val="tx1"/>
-                </a:solidFill>
-                <a:latin typeface="Calibri" panose="020F0502020204030204" pitchFamily="34" charset="0"/>
-              </a:defRPr>
-            </a:lvl7pPr>
-            <a:lvl8pPr marL="3429000" indent="-228600" eaLnBrk="0" fontAlgn="base" hangingPunct="0">
-              <a:spcBef>
-                <a:spcPct val="0"/>
-              </a:spcBef>
-              <a:spcAft>
-                <a:spcPct val="0"/>
-              </a:spcAft>
-              <a:defRPr>
-                <a:solidFill>
-                  <a:schemeClr val="tx1"/>
-                </a:solidFill>
-                <a:latin typeface="Calibri" panose="020F0502020204030204" pitchFamily="34" charset="0"/>
-              </a:defRPr>
-            </a:lvl8pPr>
-            <a:lvl9pPr marL="3886200" indent="-228600" eaLnBrk="0" fontAlgn="base" hangingPunct="0">
-              <a:spcBef>
-                <a:spcPct val="0"/>
-              </a:spcBef>
-              <a:spcAft>
-                <a:spcPct val="0"/>
-              </a:spcAft>
-              <a:defRPr>
-                <a:solidFill>
-                  <a:schemeClr val="tx1"/>
-                </a:solidFill>
-                <a:latin typeface="Calibri" panose="020F0502020204030204" pitchFamily="34" charset="0"/>
-              </a:defRPr>
-            </a:lvl9pPr>
-          </a:lstStyle>
-          <a:p>
-            <a:pPr algn="ctr" eaLnBrk="1" hangingPunct="1"/>
-            <a:r>
-              <a:rPr lang="en-US" altLang="en-US" sz="1200" dirty="0">
-                <a:latin typeface="Arial" panose="020B0604020202020204" pitchFamily="34" charset="0"/>
-                <a:ea typeface="Amazon Ember" panose="020B0603020204020204" pitchFamily="34" charset="0"/>
-                <a:cs typeface="Arial" panose="020B0604020202020204" pitchFamily="34" charset="0"/>
-              </a:rPr>
-              <a:t>Internet gateway</a:t>
-            </a:r>
-          </a:p>
-        </p:txBody>
-      </p:sp>
-      <p:sp>
-        <p:nvSpPr>
-          <p:cNvPr id="81" name="TextBox 20">
-            <a:extLst>
-              <a:ext uri="{FF2B5EF4-FFF2-40B4-BE49-F238E27FC236}">
-                <a16:creationId xmlns:a16="http://schemas.microsoft.com/office/drawing/2014/main" id="{13BF09F2-646B-274B-A7A2-004C0C856F64}"/>
-              </a:ext>
-            </a:extLst>
-          </p:cNvPr>
-          <p:cNvSpPr txBox="1">
-            <a:spLocks noChangeArrowheads="1"/>
-          </p:cNvSpPr>
-          <p:nvPr/>
-        </p:nvSpPr>
-        <p:spPr bwMode="auto">
-          <a:xfrm>
-            <a:off x="1743710" y="3854773"/>
-            <a:ext cx="1005840" cy="461665"/>
+            <a:off x="1737360" y="3657600"/>
+            <a:ext cx="1005840" cy="646331"/>
           </a:xfrm>
           <a:prstGeom prst="rect">
             <a:avLst/>
@@ -16693,7 +16532,7 @@
               <a:defRPr/>
             </a:pPr>
             <a:r>
-              <a:rPr kumimoji="0" lang="en-US" altLang="en-US" sz="1200" b="0" i="0" u="none" strike="noStrike" kern="1200" cap="none" spc="0" normalizeH="0" baseline="0" noProof="0">
+              <a:rPr kumimoji="0" lang="en-US" altLang="en-US" sz="1200" b="0" i="0" u="none" strike="noStrike" kern="1200" cap="none" spc="0" normalizeH="0" baseline="0" noProof="0" dirty="0">
                 <a:ln>
                   <a:noFill/>
                 </a:ln>
@@ -16707,7 +16546,36 @@
                 <a:ea typeface="+mn-ea"/>
                 <a:cs typeface="Arial" panose="020B0604020202020204" pitchFamily="34" charset="0"/>
               </a:rPr>
-              <a:t>Domain controller </a:t>
+              <a:t>Domain controller 1</a:t>
+            </a:r>
+          </a:p>
+          <a:p>
+            <a:pPr marL="0" marR="0" lvl="0" indent="0" algn="ctr" defTabSz="914400" rtl="0" eaLnBrk="1" fontAlgn="base" latinLnBrk="0" hangingPunct="1">
+              <a:lnSpc>
+                <a:spcPct val="100000"/>
+              </a:lnSpc>
+              <a:spcBef>
+                <a:spcPct val="0"/>
+              </a:spcBef>
+              <a:spcAft>
+                <a:spcPct val="0"/>
+              </a:spcAft>
+              <a:buClrTx/>
+              <a:buSzTx/>
+              <a:buFontTx/>
+              <a:buNone/>
+              <a:tabLst/>
+              <a:defRPr/>
+            </a:pPr>
+            <a:r>
+              <a:rPr lang="en-US" altLang="en-US" sz="1200" dirty="0">
+                <a:solidFill>
+                  <a:srgbClr val="232F3E"/>
+                </a:solidFill>
+                <a:latin typeface="Arial" panose="020B0604020202020204" pitchFamily="34" charset="0"/>
+                <a:cs typeface="Arial" panose="020B0604020202020204" pitchFamily="34" charset="0"/>
+              </a:rPr>
+              <a:t>(</a:t>
             </a:r>
             <a:r>
               <a:rPr kumimoji="0" lang="en-US" altLang="en-US" sz="1200" b="0" i="0" u="none" strike="noStrike" kern="1200" cap="none" spc="0" normalizeH="0" baseline="0" noProof="0" dirty="0">
@@ -16724,7 +16592,7 @@
                 <a:ea typeface="+mn-ea"/>
                 <a:cs typeface="Arial" panose="020B0604020202020204" pitchFamily="34" charset="0"/>
               </a:rPr>
-              <a:t>1</a:t>
+              <a:t>forest)</a:t>
             </a:r>
           </a:p>
         </p:txBody>
@@ -17602,7 +17470,7 @@
         </p:blipFill>
         <p:spPr bwMode="auto">
           <a:xfrm>
-            <a:off x="2011680" y="3383280"/>
+            <a:off x="2011680" y="3200400"/>
             <a:ext cx="469900" cy="469900"/>
           </a:xfrm>
           <a:prstGeom prst="rect">
@@ -19461,49 +19329,6 @@
           </a:p>
         </p:txBody>
       </p:sp>
-      <p:pic>
-        <p:nvPicPr>
-          <p:cNvPr id="13" name="Graphic 10">
-            <a:extLst>
-              <a:ext uri="{FF2B5EF4-FFF2-40B4-BE49-F238E27FC236}">
-                <a16:creationId xmlns:a16="http://schemas.microsoft.com/office/drawing/2014/main" id="{DFD3EEB9-FBB2-FFC8-006E-A3D192BA2F46}"/>
-              </a:ext>
-            </a:extLst>
-          </p:cNvPr>
-          <p:cNvPicPr>
-            <a:picLocks noChangeAspect="1" noChangeArrowheads="1"/>
-          </p:cNvPicPr>
-          <p:nvPr/>
-        </p:nvPicPr>
-        <p:blipFill>
-          <a:blip r:embed="rId23">
-            <a:extLst>
-              <a:ext uri="{28A0092B-C50C-407E-A947-70E740481C1C}">
-                <a14:useLocalDpi xmlns:a14="http://schemas.microsoft.com/office/drawing/2010/main" val="0"/>
-              </a:ext>
-            </a:extLst>
-          </a:blip>
-          <a:srcRect/>
-          <a:stretch>
-            <a:fillRect/>
-          </a:stretch>
-        </p:blipFill>
-        <p:spPr bwMode="auto">
-          <a:xfrm>
-            <a:off x="5212080" y="731520"/>
-            <a:ext cx="457200" cy="457200"/>
-          </a:xfrm>
-          <a:prstGeom prst="rect">
-            <a:avLst/>
-          </a:prstGeom>
-          <a:solidFill>
-            <a:schemeClr val="bg1"/>
-          </a:solidFill>
-          <a:ln>
-            <a:noFill/>
-          </a:ln>
-        </p:spPr>
-      </p:pic>
       <p:sp>
         <p:nvSpPr>
           <p:cNvPr id="65" name="Rectangle 64">
@@ -20108,295 +19933,8 @@
         </p:nvSpPr>
         <p:spPr bwMode="auto">
           <a:xfrm>
-            <a:off x="8205348" y="3855802"/>
-            <a:ext cx="1005840" cy="461665"/>
-          </a:xfrm>
-          <a:prstGeom prst="rect">
-            <a:avLst/>
-          </a:prstGeom>
-          <a:noFill/>
-          <a:ln>
-            <a:noFill/>
-          </a:ln>
-          <a:extLst>
-            <a:ext uri="{909E8E84-426E-40DD-AFC4-6F175D3DCCD1}">
-              <a14:hiddenFill xmlns:a14="http://schemas.microsoft.com/office/drawing/2010/main">
-                <a:solidFill>
-                  <a:srgbClr val="FFFFFF"/>
-                </a:solidFill>
-              </a14:hiddenFill>
-            </a:ext>
-            <a:ext uri="{91240B29-F687-4F45-9708-019B960494DF}">
-              <a14:hiddenLine xmlns:a14="http://schemas.microsoft.com/office/drawing/2010/main" w="9525">
-                <a:solidFill>
-                  <a:srgbClr val="000000"/>
-                </a:solidFill>
-                <a:miter lim="800000"/>
-                <a:headEnd/>
-                <a:tailEnd/>
-              </a14:hiddenLine>
-            </a:ext>
-          </a:extLst>
-        </p:spPr>
-        <p:txBody>
-          <a:bodyPr wrap="square">
-            <a:spAutoFit/>
-          </a:bodyPr>
-          <a:lstStyle>
-            <a:lvl1pPr>
-              <a:defRPr>
-                <a:solidFill>
-                  <a:schemeClr val="tx1"/>
-                </a:solidFill>
-                <a:latin typeface="Calibri" panose="020F0502020204030204" pitchFamily="34" charset="0"/>
-              </a:defRPr>
-            </a:lvl1pPr>
-            <a:lvl2pPr marL="742950" indent="-285750">
-              <a:defRPr>
-                <a:solidFill>
-                  <a:schemeClr val="tx1"/>
-                </a:solidFill>
-                <a:latin typeface="Calibri" panose="020F0502020204030204" pitchFamily="34" charset="0"/>
-              </a:defRPr>
-            </a:lvl2pPr>
-            <a:lvl3pPr marL="1143000" indent="-228600">
-              <a:defRPr>
-                <a:solidFill>
-                  <a:schemeClr val="tx1"/>
-                </a:solidFill>
-                <a:latin typeface="Calibri" panose="020F0502020204030204" pitchFamily="34" charset="0"/>
-              </a:defRPr>
-            </a:lvl3pPr>
-            <a:lvl4pPr marL="1600200" indent="-228600">
-              <a:defRPr>
-                <a:solidFill>
-                  <a:schemeClr val="tx1"/>
-                </a:solidFill>
-                <a:latin typeface="Calibri" panose="020F0502020204030204" pitchFamily="34" charset="0"/>
-              </a:defRPr>
-            </a:lvl4pPr>
-            <a:lvl5pPr marL="2057400" indent="-228600">
-              <a:defRPr>
-                <a:solidFill>
-                  <a:schemeClr val="tx1"/>
-                </a:solidFill>
-                <a:latin typeface="Calibri" panose="020F0502020204030204" pitchFamily="34" charset="0"/>
-              </a:defRPr>
-            </a:lvl5pPr>
-            <a:lvl6pPr marL="2514600" indent="-228600" eaLnBrk="0" fontAlgn="base" hangingPunct="0">
-              <a:spcBef>
-                <a:spcPct val="0"/>
-              </a:spcBef>
-              <a:spcAft>
-                <a:spcPct val="0"/>
-              </a:spcAft>
-              <a:defRPr>
-                <a:solidFill>
-                  <a:schemeClr val="tx1"/>
-                </a:solidFill>
-                <a:latin typeface="Calibri" panose="020F0502020204030204" pitchFamily="34" charset="0"/>
-              </a:defRPr>
-            </a:lvl6pPr>
-            <a:lvl7pPr marL="2971800" indent="-228600" eaLnBrk="0" fontAlgn="base" hangingPunct="0">
-              <a:spcBef>
-                <a:spcPct val="0"/>
-              </a:spcBef>
-              <a:spcAft>
-                <a:spcPct val="0"/>
-              </a:spcAft>
-              <a:defRPr>
-                <a:solidFill>
-                  <a:schemeClr val="tx1"/>
-                </a:solidFill>
-                <a:latin typeface="Calibri" panose="020F0502020204030204" pitchFamily="34" charset="0"/>
-              </a:defRPr>
-            </a:lvl7pPr>
-            <a:lvl8pPr marL="3429000" indent="-228600" eaLnBrk="0" fontAlgn="base" hangingPunct="0">
-              <a:spcBef>
-                <a:spcPct val="0"/>
-              </a:spcBef>
-              <a:spcAft>
-                <a:spcPct val="0"/>
-              </a:spcAft>
-              <a:defRPr>
-                <a:solidFill>
-                  <a:schemeClr val="tx1"/>
-                </a:solidFill>
-                <a:latin typeface="Calibri" panose="020F0502020204030204" pitchFamily="34" charset="0"/>
-              </a:defRPr>
-            </a:lvl8pPr>
-            <a:lvl9pPr marL="3886200" indent="-228600" eaLnBrk="0" fontAlgn="base" hangingPunct="0">
-              <a:spcBef>
-                <a:spcPct val="0"/>
-              </a:spcBef>
-              <a:spcAft>
-                <a:spcPct val="0"/>
-              </a:spcAft>
-              <a:defRPr>
-                <a:solidFill>
-                  <a:schemeClr val="tx1"/>
-                </a:solidFill>
-                <a:latin typeface="Calibri" panose="020F0502020204030204" pitchFamily="34" charset="0"/>
-              </a:defRPr>
-            </a:lvl9pPr>
-          </a:lstStyle>
-          <a:p>
-            <a:pPr marL="0" marR="0" lvl="0" indent="0" algn="ctr" defTabSz="914400" rtl="0" eaLnBrk="1" fontAlgn="base" latinLnBrk="0" hangingPunct="1">
-              <a:lnSpc>
-                <a:spcPct val="100000"/>
-              </a:lnSpc>
-              <a:spcBef>
-                <a:spcPct val="0"/>
-              </a:spcBef>
-              <a:spcAft>
-                <a:spcPct val="0"/>
-              </a:spcAft>
-              <a:buClrTx/>
-              <a:buSzTx/>
-              <a:buFontTx/>
-              <a:buNone/>
-              <a:tabLst/>
-              <a:defRPr/>
-            </a:pPr>
-            <a:r>
-              <a:rPr kumimoji="0" lang="en-US" altLang="en-US" sz="1200" b="0" i="0" u="none" strike="noStrike" kern="1200" cap="none" spc="0" normalizeH="0" baseline="0" noProof="0">
-                <a:ln>
-                  <a:noFill/>
-                </a:ln>
-                <a:solidFill>
-                  <a:srgbClr val="232F3E"/>
-                </a:solidFill>
-                <a:effectLst/>
-                <a:uLnTx/>
-                <a:uFillTx/>
-                <a:latin typeface="Arial" panose="020B0604020202020204" pitchFamily="34" charset="0"/>
-                <a:ea typeface="+mn-ea"/>
-                <a:cs typeface="Arial" panose="020B0604020202020204" pitchFamily="34" charset="0"/>
-              </a:rPr>
-              <a:t>Domain </a:t>
-            </a:r>
-            <a:r>
-              <a:rPr lang="en-US" altLang="en-US" sz="1200">
-                <a:solidFill>
-                  <a:srgbClr val="232F3E"/>
-                </a:solidFill>
-                <a:latin typeface="Arial" panose="020B0604020202020204" pitchFamily="34" charset="0"/>
-                <a:cs typeface="Arial" panose="020B0604020202020204" pitchFamily="34" charset="0"/>
-              </a:rPr>
-              <a:t>c</a:t>
-            </a:r>
-            <a:r>
-              <a:rPr kumimoji="0" lang="en-US" altLang="en-US" sz="1200" b="0" i="0" u="none" strike="noStrike" kern="1200" cap="none" spc="0" normalizeH="0" baseline="0" noProof="0">
-                <a:ln>
-                  <a:noFill/>
-                </a:ln>
-                <a:solidFill>
-                  <a:srgbClr val="232F3E"/>
-                </a:solidFill>
-                <a:effectLst/>
-                <a:uLnTx/>
-                <a:uFillTx/>
-                <a:latin typeface="Arial" panose="020B0604020202020204" pitchFamily="34" charset="0"/>
-                <a:ea typeface="+mn-ea"/>
-                <a:cs typeface="Arial" panose="020B0604020202020204" pitchFamily="34" charset="0"/>
-              </a:rPr>
-              <a:t>ontroller 2</a:t>
-            </a:r>
-            <a:endParaRPr kumimoji="0" lang="en-US" altLang="en-US" sz="1200" b="0" i="0" u="none" strike="noStrike" kern="1200" cap="none" spc="0" normalizeH="0" baseline="0" noProof="0" dirty="0">
-              <a:ln>
-                <a:noFill/>
-              </a:ln>
-              <a:solidFill>
-                <a:srgbClr val="232F3E"/>
-              </a:solidFill>
-              <a:effectLst/>
-              <a:uLnTx/>
-              <a:uFillTx/>
-              <a:latin typeface="Arial" panose="020B0604020202020204" pitchFamily="34" charset="0"/>
-              <a:ea typeface="+mn-ea"/>
-              <a:cs typeface="Arial" panose="020B0604020202020204" pitchFamily="34" charset="0"/>
-            </a:endParaRPr>
-          </a:p>
-        </p:txBody>
-      </p:sp>
-      <p:pic>
-        <p:nvPicPr>
-          <p:cNvPr id="72" name="Graphic 19">
-            <a:extLst>
-              <a:ext uri="{FF2B5EF4-FFF2-40B4-BE49-F238E27FC236}">
-                <a16:creationId xmlns:a16="http://schemas.microsoft.com/office/drawing/2014/main" id="{BA4BE236-80F7-458C-9375-902130E7CC52}"/>
-              </a:ext>
-            </a:extLst>
-          </p:cNvPr>
-          <p:cNvPicPr>
-            <a:picLocks noChangeAspect="1" noChangeArrowheads="1"/>
-          </p:cNvPicPr>
-          <p:nvPr/>
-        </p:nvPicPr>
-        <p:blipFill>
-          <a:blip r:embed="rId10">
-            <a:extLst>
-              <a:ext uri="{28A0092B-C50C-407E-A947-70E740481C1C}">
-                <a14:useLocalDpi xmlns:a14="http://schemas.microsoft.com/office/drawing/2010/main" val="0"/>
-              </a:ext>
-            </a:extLst>
-          </a:blip>
-          <a:srcRect/>
-          <a:stretch>
-            <a:fillRect/>
-          </a:stretch>
-        </p:blipFill>
-        <p:spPr bwMode="auto">
-          <a:xfrm>
-            <a:off x="7040880" y="1554480"/>
-            <a:ext cx="469900" cy="469900"/>
-          </a:xfrm>
-          <a:prstGeom prst="rect">
-            <a:avLst/>
-          </a:prstGeom>
-          <a:noFill/>
-          <a:ln>
-            <a:noFill/>
-          </a:ln>
-          <a:extLst>
-            <a:ext uri="{909E8E84-426E-40DD-AFC4-6F175D3DCCD1}">
-              <a14:hiddenFill xmlns:a14="http://schemas.microsoft.com/office/drawing/2010/main">
-                <a:solidFill>
-                  <a:srgbClr val="FFFFFF"/>
-                </a:solidFill>
-              </a14:hiddenFill>
-            </a:ext>
-            <a:ext uri="{91240B29-F687-4F45-9708-019B960494DF}">
-              <a14:hiddenLine xmlns:a14="http://schemas.microsoft.com/office/drawing/2010/main" w="9525">
-                <a:solidFill>
-                  <a:srgbClr val="000000"/>
-                </a:solidFill>
-                <a:miter lim="800000"/>
-                <a:headEnd/>
-                <a:tailEnd/>
-              </a14:hiddenLine>
-            </a:ext>
-          </a:extLst>
-        </p:spPr>
-      </p:pic>
-      <p:sp>
-        <p:nvSpPr>
-          <p:cNvPr id="73" name="TextBox 20">
-            <a:extLst>
-              <a:ext uri="{FF2B5EF4-FFF2-40B4-BE49-F238E27FC236}">
-                <a16:creationId xmlns:a16="http://schemas.microsoft.com/office/drawing/2014/main" id="{9EF7A726-79E6-4FD1-AAC9-2FF9E968F1A6}"/>
-              </a:ext>
-            </a:extLst>
-          </p:cNvPr>
-          <p:cNvSpPr txBox="1">
-            <a:spLocks noChangeArrowheads="1"/>
-          </p:cNvSpPr>
-          <p:nvPr/>
-        </p:nvSpPr>
-        <p:spPr bwMode="auto">
-          <a:xfrm>
-            <a:off x="6712190" y="2025901"/>
-            <a:ext cx="1129618" cy="276999"/>
+            <a:off x="8205348" y="3657600"/>
+            <a:ext cx="1005840" cy="646331"/>
           </a:xfrm>
           <a:prstGeom prst="rect">
             <a:avLst/>
@@ -20560,6 +20098,288 @@
                 <a:ea typeface="+mn-ea"/>
                 <a:cs typeface="Arial" panose="020B0604020202020204" pitchFamily="34" charset="0"/>
               </a:rPr>
+              <a:t>Domain controller 2</a:t>
+            </a:r>
+          </a:p>
+          <a:p>
+            <a:pPr marL="0" marR="0" lvl="0" indent="0" algn="ctr" defTabSz="914400" rtl="0" eaLnBrk="1" fontAlgn="base" latinLnBrk="0" hangingPunct="1">
+              <a:lnSpc>
+                <a:spcPct val="100000"/>
+              </a:lnSpc>
+              <a:spcBef>
+                <a:spcPct val="0"/>
+              </a:spcBef>
+              <a:spcAft>
+                <a:spcPct val="0"/>
+              </a:spcAft>
+              <a:buClrTx/>
+              <a:buSzTx/>
+              <a:buFontTx/>
+              <a:buNone/>
+              <a:tabLst/>
+              <a:defRPr/>
+            </a:pPr>
+            <a:r>
+              <a:rPr kumimoji="0" lang="en-US" altLang="en-US" sz="1200" b="0" i="0" u="none" strike="noStrike" kern="1200" cap="none" spc="0" normalizeH="0" baseline="0" noProof="0" dirty="0">
+                <a:ln>
+                  <a:noFill/>
+                </a:ln>
+                <a:solidFill>
+                  <a:srgbClr val="232F3E"/>
+                </a:solidFill>
+                <a:effectLst/>
+                <a:uLnTx/>
+                <a:uFillTx/>
+                <a:latin typeface="Arial" panose="020B0604020202020204" pitchFamily="34" charset="0"/>
+                <a:ea typeface="+mn-ea"/>
+                <a:cs typeface="Arial" panose="020B0604020202020204" pitchFamily="34" charset="0"/>
+              </a:rPr>
+              <a:t>(forest)</a:t>
+            </a:r>
+          </a:p>
+        </p:txBody>
+      </p:sp>
+      <p:pic>
+        <p:nvPicPr>
+          <p:cNvPr id="72" name="Graphic 19">
+            <a:extLst>
+              <a:ext uri="{FF2B5EF4-FFF2-40B4-BE49-F238E27FC236}">
+                <a16:creationId xmlns:a16="http://schemas.microsoft.com/office/drawing/2014/main" id="{BA4BE236-80F7-458C-9375-902130E7CC52}"/>
+              </a:ext>
+            </a:extLst>
+          </p:cNvPr>
+          <p:cNvPicPr>
+            <a:picLocks noChangeAspect="1" noChangeArrowheads="1"/>
+          </p:cNvPicPr>
+          <p:nvPr/>
+        </p:nvPicPr>
+        <p:blipFill>
+          <a:blip r:embed="rId10">
+            <a:extLst>
+              <a:ext uri="{28A0092B-C50C-407E-A947-70E740481C1C}">
+                <a14:useLocalDpi xmlns:a14="http://schemas.microsoft.com/office/drawing/2010/main" val="0"/>
+              </a:ext>
+            </a:extLst>
+          </a:blip>
+          <a:srcRect/>
+          <a:stretch>
+            <a:fillRect/>
+          </a:stretch>
+        </p:blipFill>
+        <p:spPr bwMode="auto">
+          <a:xfrm>
+            <a:off x="7040880" y="1554480"/>
+            <a:ext cx="469900" cy="469900"/>
+          </a:xfrm>
+          <a:prstGeom prst="rect">
+            <a:avLst/>
+          </a:prstGeom>
+          <a:noFill/>
+          <a:ln>
+            <a:noFill/>
+          </a:ln>
+          <a:extLst>
+            <a:ext uri="{909E8E84-426E-40DD-AFC4-6F175D3DCCD1}">
+              <a14:hiddenFill xmlns:a14="http://schemas.microsoft.com/office/drawing/2010/main">
+                <a:solidFill>
+                  <a:srgbClr val="FFFFFF"/>
+                </a:solidFill>
+              </a14:hiddenFill>
+            </a:ext>
+            <a:ext uri="{91240B29-F687-4F45-9708-019B960494DF}">
+              <a14:hiddenLine xmlns:a14="http://schemas.microsoft.com/office/drawing/2010/main" w="9525">
+                <a:solidFill>
+                  <a:srgbClr val="000000"/>
+                </a:solidFill>
+                <a:miter lim="800000"/>
+                <a:headEnd/>
+                <a:tailEnd/>
+              </a14:hiddenLine>
+            </a:ext>
+          </a:extLst>
+        </p:spPr>
+      </p:pic>
+      <p:sp>
+        <p:nvSpPr>
+          <p:cNvPr id="73" name="TextBox 20">
+            <a:extLst>
+              <a:ext uri="{FF2B5EF4-FFF2-40B4-BE49-F238E27FC236}">
+                <a16:creationId xmlns:a16="http://schemas.microsoft.com/office/drawing/2014/main" id="{9EF7A726-79E6-4FD1-AAC9-2FF9E968F1A6}"/>
+              </a:ext>
+            </a:extLst>
+          </p:cNvPr>
+          <p:cNvSpPr txBox="1">
+            <a:spLocks noChangeArrowheads="1"/>
+          </p:cNvSpPr>
+          <p:nvPr/>
+        </p:nvSpPr>
+        <p:spPr bwMode="auto">
+          <a:xfrm>
+            <a:off x="6712190" y="2025901"/>
+            <a:ext cx="1129618" cy="276999"/>
+          </a:xfrm>
+          <a:prstGeom prst="rect">
+            <a:avLst/>
+          </a:prstGeom>
+          <a:noFill/>
+          <a:ln>
+            <a:noFill/>
+          </a:ln>
+          <a:extLst>
+            <a:ext uri="{909E8E84-426E-40DD-AFC4-6F175D3DCCD1}">
+              <a14:hiddenFill xmlns:a14="http://schemas.microsoft.com/office/drawing/2010/main">
+                <a:solidFill>
+                  <a:srgbClr val="FFFFFF"/>
+                </a:solidFill>
+              </a14:hiddenFill>
+            </a:ext>
+            <a:ext uri="{91240B29-F687-4F45-9708-019B960494DF}">
+              <a14:hiddenLine xmlns:a14="http://schemas.microsoft.com/office/drawing/2010/main" w="9525">
+                <a:solidFill>
+                  <a:srgbClr val="000000"/>
+                </a:solidFill>
+                <a:miter lim="800000"/>
+                <a:headEnd/>
+                <a:tailEnd/>
+              </a14:hiddenLine>
+            </a:ext>
+          </a:extLst>
+        </p:spPr>
+        <p:txBody>
+          <a:bodyPr wrap="square">
+            <a:spAutoFit/>
+          </a:bodyPr>
+          <a:lstStyle>
+            <a:lvl1pPr>
+              <a:defRPr>
+                <a:solidFill>
+                  <a:schemeClr val="tx1"/>
+                </a:solidFill>
+                <a:latin typeface="Calibri" panose="020F0502020204030204" pitchFamily="34" charset="0"/>
+              </a:defRPr>
+            </a:lvl1pPr>
+            <a:lvl2pPr marL="742950" indent="-285750">
+              <a:defRPr>
+                <a:solidFill>
+                  <a:schemeClr val="tx1"/>
+                </a:solidFill>
+                <a:latin typeface="Calibri" panose="020F0502020204030204" pitchFamily="34" charset="0"/>
+              </a:defRPr>
+            </a:lvl2pPr>
+            <a:lvl3pPr marL="1143000" indent="-228600">
+              <a:defRPr>
+                <a:solidFill>
+                  <a:schemeClr val="tx1"/>
+                </a:solidFill>
+                <a:latin typeface="Calibri" panose="020F0502020204030204" pitchFamily="34" charset="0"/>
+              </a:defRPr>
+            </a:lvl3pPr>
+            <a:lvl4pPr marL="1600200" indent="-228600">
+              <a:defRPr>
+                <a:solidFill>
+                  <a:schemeClr val="tx1"/>
+                </a:solidFill>
+                <a:latin typeface="Calibri" panose="020F0502020204030204" pitchFamily="34" charset="0"/>
+              </a:defRPr>
+            </a:lvl4pPr>
+            <a:lvl5pPr marL="2057400" indent="-228600">
+              <a:defRPr>
+                <a:solidFill>
+                  <a:schemeClr val="tx1"/>
+                </a:solidFill>
+                <a:latin typeface="Calibri" panose="020F0502020204030204" pitchFamily="34" charset="0"/>
+              </a:defRPr>
+            </a:lvl5pPr>
+            <a:lvl6pPr marL="2514600" indent="-228600" eaLnBrk="0" fontAlgn="base" hangingPunct="0">
+              <a:spcBef>
+                <a:spcPct val="0"/>
+              </a:spcBef>
+              <a:spcAft>
+                <a:spcPct val="0"/>
+              </a:spcAft>
+              <a:defRPr>
+                <a:solidFill>
+                  <a:schemeClr val="tx1"/>
+                </a:solidFill>
+                <a:latin typeface="Calibri" panose="020F0502020204030204" pitchFamily="34" charset="0"/>
+              </a:defRPr>
+            </a:lvl6pPr>
+            <a:lvl7pPr marL="2971800" indent="-228600" eaLnBrk="0" fontAlgn="base" hangingPunct="0">
+              <a:spcBef>
+                <a:spcPct val="0"/>
+              </a:spcBef>
+              <a:spcAft>
+                <a:spcPct val="0"/>
+              </a:spcAft>
+              <a:defRPr>
+                <a:solidFill>
+                  <a:schemeClr val="tx1"/>
+                </a:solidFill>
+                <a:latin typeface="Calibri" panose="020F0502020204030204" pitchFamily="34" charset="0"/>
+              </a:defRPr>
+            </a:lvl7pPr>
+            <a:lvl8pPr marL="3429000" indent="-228600" eaLnBrk="0" fontAlgn="base" hangingPunct="0">
+              <a:spcBef>
+                <a:spcPct val="0"/>
+              </a:spcBef>
+              <a:spcAft>
+                <a:spcPct val="0"/>
+              </a:spcAft>
+              <a:defRPr>
+                <a:solidFill>
+                  <a:schemeClr val="tx1"/>
+                </a:solidFill>
+                <a:latin typeface="Calibri" panose="020F0502020204030204" pitchFamily="34" charset="0"/>
+              </a:defRPr>
+            </a:lvl8pPr>
+            <a:lvl9pPr marL="3886200" indent="-228600" eaLnBrk="0" fontAlgn="base" hangingPunct="0">
+              <a:spcBef>
+                <a:spcPct val="0"/>
+              </a:spcBef>
+              <a:spcAft>
+                <a:spcPct val="0"/>
+              </a:spcAft>
+              <a:defRPr>
+                <a:solidFill>
+                  <a:schemeClr val="tx1"/>
+                </a:solidFill>
+                <a:latin typeface="Calibri" panose="020F0502020204030204" pitchFamily="34" charset="0"/>
+              </a:defRPr>
+            </a:lvl9pPr>
+          </a:lstStyle>
+          <a:p>
+            <a:pPr marL="0" marR="0" lvl="0" indent="0" algn="ctr" defTabSz="914400" rtl="0" eaLnBrk="1" fontAlgn="base" latinLnBrk="0" hangingPunct="1">
+              <a:lnSpc>
+                <a:spcPct val="100000"/>
+              </a:lnSpc>
+              <a:spcBef>
+                <a:spcPct val="0"/>
+              </a:spcBef>
+              <a:spcAft>
+                <a:spcPct val="0"/>
+              </a:spcAft>
+              <a:buClrTx/>
+              <a:buSzTx/>
+              <a:buFontTx/>
+              <a:buNone/>
+              <a:tabLst/>
+              <a:defRPr/>
+            </a:pPr>
+            <a:r>
+              <a:rPr kumimoji="0" lang="en-US" altLang="en-US" sz="1200" b="0" i="0" u="none" strike="noStrike" kern="1200" cap="none" spc="0" normalizeH="0" baseline="0" noProof="0" dirty="0">
+                <a:ln>
+                  <a:noFill/>
+                </a:ln>
+                <a:solidFill>
+                  <a:srgbClr val="232F3E"/>
+                </a:solidFill>
+                <a:effectLst/>
+                <a:uLnTx/>
+                <a:uFillTx/>
+                <a:latin typeface="Arial" panose="020B0604020202020204" pitchFamily="34" charset="0"/>
+                <a:ea typeface="+mn-ea"/>
+                <a:cs typeface="Arial" panose="020B0604020202020204" pitchFamily="34" charset="0"/>
+              </a:rPr>
               <a:t>RD Gateway</a:t>
             </a:r>
           </a:p>
@@ -20714,7 +20534,7 @@
         </p:blipFill>
         <p:spPr bwMode="auto">
           <a:xfrm>
-            <a:off x="8473318" y="3383280"/>
+            <a:off x="8473318" y="3200400"/>
             <a:ext cx="469900" cy="469900"/>
           </a:xfrm>
           <a:prstGeom prst="rect">
@@ -22543,167 +22363,6 @@
       </p:pic>
       <p:sp>
         <p:nvSpPr>
-          <p:cNvPr id="28" name="TextBox 12">
-            <a:extLst>
-              <a:ext uri="{FF2B5EF4-FFF2-40B4-BE49-F238E27FC236}">
-                <a16:creationId xmlns:a16="http://schemas.microsoft.com/office/drawing/2014/main" id="{BF3F084C-5C3C-6A97-A793-7D98295C84B8}"/>
-              </a:ext>
-            </a:extLst>
-          </p:cNvPr>
-          <p:cNvSpPr txBox="1">
-            <a:spLocks noChangeArrowheads="1"/>
-          </p:cNvSpPr>
-          <p:nvPr/>
-        </p:nvSpPr>
-        <p:spPr bwMode="auto">
-          <a:xfrm>
-            <a:off x="4780299" y="1115475"/>
-            <a:ext cx="1371600" cy="276999"/>
-          </a:xfrm>
-          <a:prstGeom prst="rect">
-            <a:avLst/>
-          </a:prstGeom>
-          <a:noFill/>
-          <a:ln>
-            <a:noFill/>
-          </a:ln>
-          <a:extLst>
-            <a:ext uri="{909E8E84-426E-40DD-AFC4-6F175D3DCCD1}">
-              <a14:hiddenFill xmlns:a14="http://schemas.microsoft.com/office/drawing/2010/main">
-                <a:solidFill>
-                  <a:srgbClr val="FFFFFF"/>
-                </a:solidFill>
-              </a14:hiddenFill>
-            </a:ext>
-            <a:ext uri="{91240B29-F687-4F45-9708-019B960494DF}">
-              <a14:hiddenLine xmlns:a14="http://schemas.microsoft.com/office/drawing/2010/main" w="9525">
-                <a:solidFill>
-                  <a:srgbClr val="000000"/>
-                </a:solidFill>
-                <a:miter lim="800000"/>
-                <a:headEnd/>
-                <a:tailEnd/>
-              </a14:hiddenLine>
-            </a:ext>
-          </a:extLst>
-        </p:spPr>
-        <p:txBody>
-          <a:bodyPr>
-            <a:spAutoFit/>
-          </a:bodyPr>
-          <a:lstStyle>
-            <a:lvl1pPr>
-              <a:defRPr>
-                <a:solidFill>
-                  <a:schemeClr val="tx1"/>
-                </a:solidFill>
-                <a:latin typeface="Calibri" panose="020F0502020204030204" pitchFamily="34" charset="0"/>
-              </a:defRPr>
-            </a:lvl1pPr>
-            <a:lvl2pPr marL="742950" indent="-285750">
-              <a:defRPr>
-                <a:solidFill>
-                  <a:schemeClr val="tx1"/>
-                </a:solidFill>
-                <a:latin typeface="Calibri" panose="020F0502020204030204" pitchFamily="34" charset="0"/>
-              </a:defRPr>
-            </a:lvl2pPr>
-            <a:lvl3pPr marL="1143000" indent="-228600">
-              <a:defRPr>
-                <a:solidFill>
-                  <a:schemeClr val="tx1"/>
-                </a:solidFill>
-                <a:latin typeface="Calibri" panose="020F0502020204030204" pitchFamily="34" charset="0"/>
-              </a:defRPr>
-            </a:lvl3pPr>
-            <a:lvl4pPr marL="1600200" indent="-228600">
-              <a:defRPr>
-                <a:solidFill>
-                  <a:schemeClr val="tx1"/>
-                </a:solidFill>
-                <a:latin typeface="Calibri" panose="020F0502020204030204" pitchFamily="34" charset="0"/>
-              </a:defRPr>
-            </a:lvl4pPr>
-            <a:lvl5pPr marL="2057400" indent="-228600">
-              <a:defRPr>
-                <a:solidFill>
-                  <a:schemeClr val="tx1"/>
-                </a:solidFill>
-                <a:latin typeface="Calibri" panose="020F0502020204030204" pitchFamily="34" charset="0"/>
-              </a:defRPr>
-            </a:lvl5pPr>
-            <a:lvl6pPr marL="2514600" indent="-228600" eaLnBrk="0" fontAlgn="base" hangingPunct="0">
-              <a:spcBef>
-                <a:spcPct val="0"/>
-              </a:spcBef>
-              <a:spcAft>
-                <a:spcPct val="0"/>
-              </a:spcAft>
-              <a:defRPr>
-                <a:solidFill>
-                  <a:schemeClr val="tx1"/>
-                </a:solidFill>
-                <a:latin typeface="Calibri" panose="020F0502020204030204" pitchFamily="34" charset="0"/>
-              </a:defRPr>
-            </a:lvl6pPr>
-            <a:lvl7pPr marL="2971800" indent="-228600" eaLnBrk="0" fontAlgn="base" hangingPunct="0">
-              <a:spcBef>
-                <a:spcPct val="0"/>
-              </a:spcBef>
-              <a:spcAft>
-                <a:spcPct val="0"/>
-              </a:spcAft>
-              <a:defRPr>
-                <a:solidFill>
-                  <a:schemeClr val="tx1"/>
-                </a:solidFill>
-                <a:latin typeface="Calibri" panose="020F0502020204030204" pitchFamily="34" charset="0"/>
-              </a:defRPr>
-            </a:lvl7pPr>
-            <a:lvl8pPr marL="3429000" indent="-228600" eaLnBrk="0" fontAlgn="base" hangingPunct="0">
-              <a:spcBef>
-                <a:spcPct val="0"/>
-              </a:spcBef>
-              <a:spcAft>
-                <a:spcPct val="0"/>
-              </a:spcAft>
-              <a:defRPr>
-                <a:solidFill>
-                  <a:schemeClr val="tx1"/>
-                </a:solidFill>
-                <a:latin typeface="Calibri" panose="020F0502020204030204" pitchFamily="34" charset="0"/>
-              </a:defRPr>
-            </a:lvl8pPr>
-            <a:lvl9pPr marL="3886200" indent="-228600" eaLnBrk="0" fontAlgn="base" hangingPunct="0">
-              <a:spcBef>
-                <a:spcPct val="0"/>
-              </a:spcBef>
-              <a:spcAft>
-                <a:spcPct val="0"/>
-              </a:spcAft>
-              <a:defRPr>
-                <a:solidFill>
-                  <a:schemeClr val="tx1"/>
-                </a:solidFill>
-                <a:latin typeface="Calibri" panose="020F0502020204030204" pitchFamily="34" charset="0"/>
-              </a:defRPr>
-            </a:lvl9pPr>
-          </a:lstStyle>
-          <a:p>
-            <a:pPr algn="ctr" eaLnBrk="1" hangingPunct="1"/>
-            <a:r>
-              <a:rPr lang="en-US" altLang="en-US" sz="1200" dirty="0">
-                <a:latin typeface="Arial" panose="020B0604020202020204" pitchFamily="34" charset="0"/>
-                <a:ea typeface="Amazon Ember" panose="020B0603020204020204" pitchFamily="34" charset="0"/>
-                <a:cs typeface="Arial" panose="020B0604020202020204" pitchFamily="34" charset="0"/>
-              </a:rPr>
-              <a:t>Internet gateway</a:t>
-            </a:r>
-          </a:p>
-        </p:txBody>
-      </p:sp>
-      <p:sp>
-        <p:nvSpPr>
           <p:cNvPr id="29" name="TextBox 20">
             <a:extLst>
               <a:ext uri="{FF2B5EF4-FFF2-40B4-BE49-F238E27FC236}">
@@ -24283,10 +23942,10 @@
       </p:pic>
       <p:pic>
         <p:nvPicPr>
-          <p:cNvPr id="47107" name="Graphic 10">
-            <a:extLst>
-              <a:ext uri="{FF2B5EF4-FFF2-40B4-BE49-F238E27FC236}">
-                <a16:creationId xmlns:a16="http://schemas.microsoft.com/office/drawing/2014/main" id="{14C2DF48-A8DB-D3F7-DECA-88F1C14A0341}"/>
+          <p:cNvPr id="47108" name="Graphic 8">
+            <a:extLst>
+              <a:ext uri="{FF2B5EF4-FFF2-40B4-BE49-F238E27FC236}">
+                <a16:creationId xmlns:a16="http://schemas.microsoft.com/office/drawing/2014/main" id="{5FE654E1-C03D-BB34-BD43-F26DA7363458}"/>
               </a:ext>
             </a:extLst>
           </p:cNvPr>
@@ -24310,26 +23969,43 @@
         </p:blipFill>
         <p:spPr bwMode="auto">
           <a:xfrm>
-            <a:off x="5212080" y="650970"/>
+            <a:off x="5212080" y="2348750"/>
             <a:ext cx="457200" cy="457200"/>
           </a:xfrm>
           <a:prstGeom prst="rect">
             <a:avLst/>
           </a:prstGeom>
-          <a:solidFill>
-            <a:schemeClr val="bg1"/>
-          </a:solidFill>
+          <a:noFill/>
           <a:ln>
             <a:noFill/>
           </a:ln>
+          <a:extLst>
+            <a:ext uri="{909E8E84-426E-40DD-AFC4-6F175D3DCCD1}">
+              <a14:hiddenFill xmlns:a14="http://schemas.microsoft.com/office/drawing/2010/main">
+                <a:solidFill>
+                  <a:srgbClr val="FFFFFF"/>
+                </a:solidFill>
+              </a14:hiddenFill>
+            </a:ext>
+            <a:ext uri="{91240B29-F687-4F45-9708-019B960494DF}">
+              <a14:hiddenLine xmlns:a14="http://schemas.microsoft.com/office/drawing/2010/main" w="9525">
+                <a:solidFill>
+                  <a:srgbClr val="000000"/>
+                </a:solidFill>
+                <a:miter lim="800000"/>
+                <a:headEnd/>
+                <a:tailEnd/>
+              </a14:hiddenLine>
+            </a:ext>
+          </a:extLst>
         </p:spPr>
       </p:pic>
       <p:pic>
         <p:nvPicPr>
-          <p:cNvPr id="47108" name="Graphic 8">
-            <a:extLst>
-              <a:ext uri="{FF2B5EF4-FFF2-40B4-BE49-F238E27FC236}">
-                <a16:creationId xmlns:a16="http://schemas.microsoft.com/office/drawing/2014/main" id="{5FE654E1-C03D-BB34-BD43-F26DA7363458}"/>
+          <p:cNvPr id="47109" name="Graphic 7">
+            <a:extLst>
+              <a:ext uri="{FF2B5EF4-FFF2-40B4-BE49-F238E27FC236}">
+                <a16:creationId xmlns:a16="http://schemas.microsoft.com/office/drawing/2014/main" id="{6B49CB1E-8BDC-989B-0D86-AE41725B6E1A}"/>
               </a:ext>
             </a:extLst>
           </p:cNvPr>
@@ -24340,66 +24016,6 @@
         </p:nvPicPr>
         <p:blipFill>
           <a:blip r:embed="rId15">
-            <a:extLst>
-              <a:ext uri="{28A0092B-C50C-407E-A947-70E740481C1C}">
-                <a14:useLocalDpi xmlns:a14="http://schemas.microsoft.com/office/drawing/2010/main" val="0"/>
-              </a:ext>
-            </a:extLst>
-          </a:blip>
-          <a:srcRect/>
-          <a:stretch>
-            <a:fillRect/>
-          </a:stretch>
-        </p:blipFill>
-        <p:spPr bwMode="auto">
-          <a:xfrm>
-            <a:off x="5212080" y="2348750"/>
-            <a:ext cx="457200" cy="457200"/>
-          </a:xfrm>
-          <a:prstGeom prst="rect">
-            <a:avLst/>
-          </a:prstGeom>
-          <a:noFill/>
-          <a:ln>
-            <a:noFill/>
-          </a:ln>
-          <a:extLst>
-            <a:ext uri="{909E8E84-426E-40DD-AFC4-6F175D3DCCD1}">
-              <a14:hiddenFill xmlns:a14="http://schemas.microsoft.com/office/drawing/2010/main">
-                <a:solidFill>
-                  <a:srgbClr val="FFFFFF"/>
-                </a:solidFill>
-              </a14:hiddenFill>
-            </a:ext>
-            <a:ext uri="{91240B29-F687-4F45-9708-019B960494DF}">
-              <a14:hiddenLine xmlns:a14="http://schemas.microsoft.com/office/drawing/2010/main" w="9525">
-                <a:solidFill>
-                  <a:srgbClr val="000000"/>
-                </a:solidFill>
-                <a:miter lim="800000"/>
-                <a:headEnd/>
-                <a:tailEnd/>
-              </a14:hiddenLine>
-            </a:ext>
-          </a:extLst>
-        </p:spPr>
-      </p:pic>
-      <p:pic>
-        <p:nvPicPr>
-          <p:cNvPr id="47109" name="Graphic 7">
-            <a:extLst>
-              <a:ext uri="{FF2B5EF4-FFF2-40B4-BE49-F238E27FC236}">
-                <a16:creationId xmlns:a16="http://schemas.microsoft.com/office/drawing/2014/main" id="{6B49CB1E-8BDC-989B-0D86-AE41725B6E1A}"/>
-              </a:ext>
-            </a:extLst>
-          </p:cNvPr>
-          <p:cNvPicPr>
-            <a:picLocks noChangeAspect="1" noChangeArrowheads="1"/>
-          </p:cNvPicPr>
-          <p:nvPr/>
-        </p:nvPicPr>
-        <p:blipFill>
-          <a:blip r:embed="rId16">
             <a:extLst>
               <a:ext uri="{28A0092B-C50C-407E-A947-70E740481C1C}">
                 <a14:useLocalDpi xmlns:a14="http://schemas.microsoft.com/office/drawing/2010/main" val="0"/>
@@ -24620,7 +24236,7 @@
           <p:nvPr/>
         </p:nvPicPr>
         <p:blipFill>
-          <a:blip r:embed="rId17">
+          <a:blip r:embed="rId16">
             <a:extLst>
               <a:ext uri="{28A0092B-C50C-407E-A947-70E740481C1C}">
                 <a14:useLocalDpi xmlns:a14="http://schemas.microsoft.com/office/drawing/2010/main" val="0"/>
@@ -24841,7 +24457,7 @@
           <p:nvPr/>
         </p:nvPicPr>
         <p:blipFill>
-          <a:blip r:embed="rId17">
+          <a:blip r:embed="rId16">
             <a:extLst>
               <a:ext uri="{28A0092B-C50C-407E-A947-70E740481C1C}">
                 <a14:useLocalDpi xmlns:a14="http://schemas.microsoft.com/office/drawing/2010/main" val="0"/>
@@ -25062,7 +24678,7 @@
           <p:nvPr/>
         </p:nvPicPr>
         <p:blipFill>
-          <a:blip r:embed="rId18">
+          <a:blip r:embed="rId17">
             <a:extLst>
               <a:ext uri="{28A0092B-C50C-407E-A947-70E740481C1C}">
                 <a14:useLocalDpi xmlns:a14="http://schemas.microsoft.com/office/drawing/2010/main" val="0"/>
@@ -25283,7 +24899,7 @@
           <p:nvPr/>
         </p:nvPicPr>
         <p:blipFill>
-          <a:blip r:embed="rId19">
+          <a:blip r:embed="rId18">
             <a:extLst>
               <a:ext uri="{28A0092B-C50C-407E-A947-70E740481C1C}">
                 <a14:useLocalDpi xmlns:a14="http://schemas.microsoft.com/office/drawing/2010/main" val="0"/>
@@ -25504,7 +25120,7 @@
           <p:nvPr/>
         </p:nvPicPr>
         <p:blipFill>
-          <a:blip r:embed="rId20">
+          <a:blip r:embed="rId19">
             <a:extLst>
               <a:ext uri="{28A0092B-C50C-407E-A947-70E740481C1C}">
                 <a14:useLocalDpi xmlns:a14="http://schemas.microsoft.com/office/drawing/2010/main" val="0"/>
@@ -25725,7 +25341,7 @@
           <p:nvPr/>
         </p:nvPicPr>
         <p:blipFill>
-          <a:blip r:embed="rId21">
+          <a:blip r:embed="rId20">
             <a:extLst>
               <a:ext uri="{28A0092B-C50C-407E-A947-70E740481C1C}">
                 <a14:useLocalDpi xmlns:a14="http://schemas.microsoft.com/office/drawing/2010/main" val="0"/>
@@ -25946,7 +25562,7 @@
           <p:nvPr/>
         </p:nvPicPr>
         <p:blipFill>
-          <a:blip r:embed="rId22">
+          <a:blip r:embed="rId21">
             <a:extLst>
               <a:ext uri="{28A0092B-C50C-407E-A947-70E740481C1C}">
                 <a14:useLocalDpi xmlns:a14="http://schemas.microsoft.com/office/drawing/2010/main" val="0"/>
@@ -26328,7 +25944,7 @@
           <p:nvPr/>
         </p:nvPicPr>
         <p:blipFill>
-          <a:blip r:embed="rId23">
+          <a:blip r:embed="rId22">
             <a:extLst>
               <a:ext uri="{28A0092B-C50C-407E-A947-70E740481C1C}">
                 <a14:useLocalDpi xmlns:a14="http://schemas.microsoft.com/office/drawing/2010/main" val="0"/>
@@ -27893,167 +27509,6 @@
       </p:pic>
       <p:sp>
         <p:nvSpPr>
-          <p:cNvPr id="78" name="TextBox 12">
-            <a:extLst>
-              <a:ext uri="{FF2B5EF4-FFF2-40B4-BE49-F238E27FC236}">
-                <a16:creationId xmlns:a16="http://schemas.microsoft.com/office/drawing/2014/main" id="{FD1D5076-2EB7-AC48-9BB5-DF7900D47544}"/>
-              </a:ext>
-            </a:extLst>
-          </p:cNvPr>
-          <p:cNvSpPr txBox="1">
-            <a:spLocks noChangeArrowheads="1"/>
-          </p:cNvSpPr>
-          <p:nvPr/>
-        </p:nvSpPr>
-        <p:spPr bwMode="auto">
-          <a:xfrm>
-            <a:off x="4782312" y="1115568"/>
-            <a:ext cx="1371600" cy="276999"/>
-          </a:xfrm>
-          <a:prstGeom prst="rect">
-            <a:avLst/>
-          </a:prstGeom>
-          <a:noFill/>
-          <a:ln>
-            <a:noFill/>
-          </a:ln>
-          <a:extLst>
-            <a:ext uri="{909E8E84-426E-40DD-AFC4-6F175D3DCCD1}">
-              <a14:hiddenFill xmlns:a14="http://schemas.microsoft.com/office/drawing/2010/main">
-                <a:solidFill>
-                  <a:srgbClr val="FFFFFF"/>
-                </a:solidFill>
-              </a14:hiddenFill>
-            </a:ext>
-            <a:ext uri="{91240B29-F687-4F45-9708-019B960494DF}">
-              <a14:hiddenLine xmlns:a14="http://schemas.microsoft.com/office/drawing/2010/main" w="9525">
-                <a:solidFill>
-                  <a:srgbClr val="000000"/>
-                </a:solidFill>
-                <a:miter lim="800000"/>
-                <a:headEnd/>
-                <a:tailEnd/>
-              </a14:hiddenLine>
-            </a:ext>
-          </a:extLst>
-        </p:spPr>
-        <p:txBody>
-          <a:bodyPr>
-            <a:spAutoFit/>
-          </a:bodyPr>
-          <a:lstStyle>
-            <a:lvl1pPr>
-              <a:defRPr>
-                <a:solidFill>
-                  <a:schemeClr val="tx1"/>
-                </a:solidFill>
-                <a:latin typeface="Calibri" panose="020F0502020204030204" pitchFamily="34" charset="0"/>
-              </a:defRPr>
-            </a:lvl1pPr>
-            <a:lvl2pPr marL="742950" indent="-285750">
-              <a:defRPr>
-                <a:solidFill>
-                  <a:schemeClr val="tx1"/>
-                </a:solidFill>
-                <a:latin typeface="Calibri" panose="020F0502020204030204" pitchFamily="34" charset="0"/>
-              </a:defRPr>
-            </a:lvl2pPr>
-            <a:lvl3pPr marL="1143000" indent="-228600">
-              <a:defRPr>
-                <a:solidFill>
-                  <a:schemeClr val="tx1"/>
-                </a:solidFill>
-                <a:latin typeface="Calibri" panose="020F0502020204030204" pitchFamily="34" charset="0"/>
-              </a:defRPr>
-            </a:lvl3pPr>
-            <a:lvl4pPr marL="1600200" indent="-228600">
-              <a:defRPr>
-                <a:solidFill>
-                  <a:schemeClr val="tx1"/>
-                </a:solidFill>
-                <a:latin typeface="Calibri" panose="020F0502020204030204" pitchFamily="34" charset="0"/>
-              </a:defRPr>
-            </a:lvl4pPr>
-            <a:lvl5pPr marL="2057400" indent="-228600">
-              <a:defRPr>
-                <a:solidFill>
-                  <a:schemeClr val="tx1"/>
-                </a:solidFill>
-                <a:latin typeface="Calibri" panose="020F0502020204030204" pitchFamily="34" charset="0"/>
-              </a:defRPr>
-            </a:lvl5pPr>
-            <a:lvl6pPr marL="2514600" indent="-228600" eaLnBrk="0" fontAlgn="base" hangingPunct="0">
-              <a:spcBef>
-                <a:spcPct val="0"/>
-              </a:spcBef>
-              <a:spcAft>
-                <a:spcPct val="0"/>
-              </a:spcAft>
-              <a:defRPr>
-                <a:solidFill>
-                  <a:schemeClr val="tx1"/>
-                </a:solidFill>
-                <a:latin typeface="Calibri" panose="020F0502020204030204" pitchFamily="34" charset="0"/>
-              </a:defRPr>
-            </a:lvl6pPr>
-            <a:lvl7pPr marL="2971800" indent="-228600" eaLnBrk="0" fontAlgn="base" hangingPunct="0">
-              <a:spcBef>
-                <a:spcPct val="0"/>
-              </a:spcBef>
-              <a:spcAft>
-                <a:spcPct val="0"/>
-              </a:spcAft>
-              <a:defRPr>
-                <a:solidFill>
-                  <a:schemeClr val="tx1"/>
-                </a:solidFill>
-                <a:latin typeface="Calibri" panose="020F0502020204030204" pitchFamily="34" charset="0"/>
-              </a:defRPr>
-            </a:lvl7pPr>
-            <a:lvl8pPr marL="3429000" indent="-228600" eaLnBrk="0" fontAlgn="base" hangingPunct="0">
-              <a:spcBef>
-                <a:spcPct val="0"/>
-              </a:spcBef>
-              <a:spcAft>
-                <a:spcPct val="0"/>
-              </a:spcAft>
-              <a:defRPr>
-                <a:solidFill>
-                  <a:schemeClr val="tx1"/>
-                </a:solidFill>
-                <a:latin typeface="Calibri" panose="020F0502020204030204" pitchFamily="34" charset="0"/>
-              </a:defRPr>
-            </a:lvl8pPr>
-            <a:lvl9pPr marL="3886200" indent="-228600" eaLnBrk="0" fontAlgn="base" hangingPunct="0">
-              <a:spcBef>
-                <a:spcPct val="0"/>
-              </a:spcBef>
-              <a:spcAft>
-                <a:spcPct val="0"/>
-              </a:spcAft>
-              <a:defRPr>
-                <a:solidFill>
-                  <a:schemeClr val="tx1"/>
-                </a:solidFill>
-                <a:latin typeface="Calibri" panose="020F0502020204030204" pitchFamily="34" charset="0"/>
-              </a:defRPr>
-            </a:lvl9pPr>
-          </a:lstStyle>
-          <a:p>
-            <a:pPr algn="ctr" eaLnBrk="1" hangingPunct="1"/>
-            <a:r>
-              <a:rPr lang="en-US" altLang="en-US" sz="1200" dirty="0">
-                <a:latin typeface="Arial" panose="020B0604020202020204" pitchFamily="34" charset="0"/>
-                <a:ea typeface="Amazon Ember" panose="020B0603020204020204" pitchFamily="34" charset="0"/>
-                <a:cs typeface="Arial" panose="020B0604020202020204" pitchFamily="34" charset="0"/>
-              </a:rPr>
-              <a:t>Internet gateway</a:t>
-            </a:r>
-          </a:p>
-        </p:txBody>
-      </p:sp>
-      <p:sp>
-        <p:nvSpPr>
           <p:cNvPr id="83" name="TextBox 20">
             <a:extLst>
               <a:ext uri="{FF2B5EF4-FFF2-40B4-BE49-F238E27FC236}">
@@ -28922,10 +28377,10 @@
       </p:pic>
       <p:pic>
         <p:nvPicPr>
-          <p:cNvPr id="13" name="Graphic 10">
-            <a:extLst>
-              <a:ext uri="{FF2B5EF4-FFF2-40B4-BE49-F238E27FC236}">
-                <a16:creationId xmlns:a16="http://schemas.microsoft.com/office/drawing/2014/main" id="{DFD3EEB9-FBB2-FFC8-006E-A3D192BA2F46}"/>
+          <p:cNvPr id="14" name="Graphic 8">
+            <a:extLst>
+              <a:ext uri="{FF2B5EF4-FFF2-40B4-BE49-F238E27FC236}">
+                <a16:creationId xmlns:a16="http://schemas.microsoft.com/office/drawing/2014/main" id="{D1B554F6-CD6E-9E33-52C7-F59A0DC7673A}"/>
               </a:ext>
             </a:extLst>
           </p:cNvPr>
@@ -28949,26 +28404,43 @@
         </p:blipFill>
         <p:spPr bwMode="auto">
           <a:xfrm>
-            <a:off x="5212080" y="649224"/>
+            <a:off x="5212080" y="1554480"/>
             <a:ext cx="457200" cy="457200"/>
           </a:xfrm>
           <a:prstGeom prst="rect">
             <a:avLst/>
           </a:prstGeom>
-          <a:solidFill>
-            <a:schemeClr val="bg1"/>
-          </a:solidFill>
+          <a:noFill/>
           <a:ln>
             <a:noFill/>
           </a:ln>
+          <a:extLst>
+            <a:ext uri="{909E8E84-426E-40DD-AFC4-6F175D3DCCD1}">
+              <a14:hiddenFill xmlns:a14="http://schemas.microsoft.com/office/drawing/2010/main">
+                <a:solidFill>
+                  <a:srgbClr val="FFFFFF"/>
+                </a:solidFill>
+              </a14:hiddenFill>
+            </a:ext>
+            <a:ext uri="{91240B29-F687-4F45-9708-019B960494DF}">
+              <a14:hiddenLine xmlns:a14="http://schemas.microsoft.com/office/drawing/2010/main" w="9525">
+                <a:solidFill>
+                  <a:srgbClr val="000000"/>
+                </a:solidFill>
+                <a:miter lim="800000"/>
+                <a:headEnd/>
+                <a:tailEnd/>
+              </a14:hiddenLine>
+            </a:ext>
+          </a:extLst>
         </p:spPr>
       </p:pic>
       <p:pic>
         <p:nvPicPr>
-          <p:cNvPr id="14" name="Graphic 8">
-            <a:extLst>
-              <a:ext uri="{FF2B5EF4-FFF2-40B4-BE49-F238E27FC236}">
-                <a16:creationId xmlns:a16="http://schemas.microsoft.com/office/drawing/2014/main" id="{D1B554F6-CD6E-9E33-52C7-F59A0DC7673A}"/>
+          <p:cNvPr id="15" name="Graphic 7">
+            <a:extLst>
+              <a:ext uri="{FF2B5EF4-FFF2-40B4-BE49-F238E27FC236}">
+                <a16:creationId xmlns:a16="http://schemas.microsoft.com/office/drawing/2014/main" id="{15DB8C92-F348-CD3D-F320-6008EA6CFD4C}"/>
               </a:ext>
             </a:extLst>
           </p:cNvPr>
@@ -28979,66 +28451,6 @@
         </p:nvPicPr>
         <p:blipFill>
           <a:blip r:embed="rId15">
-            <a:extLst>
-              <a:ext uri="{28A0092B-C50C-407E-A947-70E740481C1C}">
-                <a14:useLocalDpi xmlns:a14="http://schemas.microsoft.com/office/drawing/2010/main" val="0"/>
-              </a:ext>
-            </a:extLst>
-          </a:blip>
-          <a:srcRect/>
-          <a:stretch>
-            <a:fillRect/>
-          </a:stretch>
-        </p:blipFill>
-        <p:spPr bwMode="auto">
-          <a:xfrm>
-            <a:off x="5212080" y="1554480"/>
-            <a:ext cx="457200" cy="457200"/>
-          </a:xfrm>
-          <a:prstGeom prst="rect">
-            <a:avLst/>
-          </a:prstGeom>
-          <a:noFill/>
-          <a:ln>
-            <a:noFill/>
-          </a:ln>
-          <a:extLst>
-            <a:ext uri="{909E8E84-426E-40DD-AFC4-6F175D3DCCD1}">
-              <a14:hiddenFill xmlns:a14="http://schemas.microsoft.com/office/drawing/2010/main">
-                <a:solidFill>
-                  <a:srgbClr val="FFFFFF"/>
-                </a:solidFill>
-              </a14:hiddenFill>
-            </a:ext>
-            <a:ext uri="{91240B29-F687-4F45-9708-019B960494DF}">
-              <a14:hiddenLine xmlns:a14="http://schemas.microsoft.com/office/drawing/2010/main" w="9525">
-                <a:solidFill>
-                  <a:srgbClr val="000000"/>
-                </a:solidFill>
-                <a:miter lim="800000"/>
-                <a:headEnd/>
-                <a:tailEnd/>
-              </a14:hiddenLine>
-            </a:ext>
-          </a:extLst>
-        </p:spPr>
-      </p:pic>
-      <p:pic>
-        <p:nvPicPr>
-          <p:cNvPr id="15" name="Graphic 7">
-            <a:extLst>
-              <a:ext uri="{FF2B5EF4-FFF2-40B4-BE49-F238E27FC236}">
-                <a16:creationId xmlns:a16="http://schemas.microsoft.com/office/drawing/2014/main" id="{15DB8C92-F348-CD3D-F320-6008EA6CFD4C}"/>
-              </a:ext>
-            </a:extLst>
-          </p:cNvPr>
-          <p:cNvPicPr>
-            <a:picLocks noChangeAspect="1" noChangeArrowheads="1"/>
-          </p:cNvPicPr>
-          <p:nvPr/>
-        </p:nvPicPr>
-        <p:blipFill>
-          <a:blip r:embed="rId16">
             <a:extLst>
               <a:ext uri="{28A0092B-C50C-407E-A947-70E740481C1C}">
                 <a14:useLocalDpi xmlns:a14="http://schemas.microsoft.com/office/drawing/2010/main" val="0"/>
@@ -29259,7 +28671,7 @@
           <p:nvPr/>
         </p:nvPicPr>
         <p:blipFill>
-          <a:blip r:embed="rId17">
+          <a:blip r:embed="rId16">
             <a:extLst>
               <a:ext uri="{28A0092B-C50C-407E-A947-70E740481C1C}">
                 <a14:useLocalDpi xmlns:a14="http://schemas.microsoft.com/office/drawing/2010/main" val="0"/>
@@ -29480,7 +28892,7 @@
           <p:nvPr/>
         </p:nvPicPr>
         <p:blipFill>
-          <a:blip r:embed="rId17">
+          <a:blip r:embed="rId16">
             <a:extLst>
               <a:ext uri="{28A0092B-C50C-407E-A947-70E740481C1C}">
                 <a14:useLocalDpi xmlns:a14="http://schemas.microsoft.com/office/drawing/2010/main" val="0"/>
@@ -29701,7 +29113,7 @@
           <p:nvPr/>
         </p:nvPicPr>
         <p:blipFill>
-          <a:blip r:embed="rId18">
+          <a:blip r:embed="rId17">
             <a:extLst>
               <a:ext uri="{28A0092B-C50C-407E-A947-70E740481C1C}">
                 <a14:useLocalDpi xmlns:a14="http://schemas.microsoft.com/office/drawing/2010/main" val="0"/>
@@ -29922,7 +29334,7 @@
           <p:nvPr/>
         </p:nvPicPr>
         <p:blipFill>
-          <a:blip r:embed="rId19">
+          <a:blip r:embed="rId18">
             <a:extLst>
               <a:ext uri="{28A0092B-C50C-407E-A947-70E740481C1C}">
                 <a14:useLocalDpi xmlns:a14="http://schemas.microsoft.com/office/drawing/2010/main" val="0"/>
@@ -30143,7 +29555,7 @@
           <p:nvPr/>
         </p:nvPicPr>
         <p:blipFill>
-          <a:blip r:embed="rId20">
+          <a:blip r:embed="rId19">
             <a:extLst>
               <a:ext uri="{28A0092B-C50C-407E-A947-70E740481C1C}">
                 <a14:useLocalDpi xmlns:a14="http://schemas.microsoft.com/office/drawing/2010/main" val="0"/>
@@ -30364,7 +29776,7 @@
           <p:nvPr/>
         </p:nvPicPr>
         <p:blipFill>
-          <a:blip r:embed="rId21">
+          <a:blip r:embed="rId20">
             <a:extLst>
               <a:ext uri="{28A0092B-C50C-407E-A947-70E740481C1C}">
                 <a14:useLocalDpi xmlns:a14="http://schemas.microsoft.com/office/drawing/2010/main" val="0"/>
@@ -30585,7 +29997,7 @@
           <p:nvPr/>
         </p:nvPicPr>
         <p:blipFill>
-          <a:blip r:embed="rId22">
+          <a:blip r:embed="rId21">
             <a:extLst>
               <a:ext uri="{28A0092B-C50C-407E-A947-70E740481C1C}">
                 <a14:useLocalDpi xmlns:a14="http://schemas.microsoft.com/office/drawing/2010/main" val="0"/>
@@ -30806,7 +30218,7 @@
           <p:nvPr/>
         </p:nvPicPr>
         <p:blipFill>
-          <a:blip r:embed="rId23">
+          <a:blip r:embed="rId22">
             <a:extLst>
               <a:ext uri="{28A0092B-C50C-407E-A947-70E740481C1C}">
                 <a14:useLocalDpi xmlns:a14="http://schemas.microsoft.com/office/drawing/2010/main" val="0"/>

</xml_diff>

<commit_message>
TW edits for styling and diagrams
</commit_message>
<xml_diff>
--- a/docs/deployment_guide/images/freeradius-mfa-workspaces-architecture-diagram.pptx
+++ b/docs/deployment_guide/images/freeradius-mfa-workspaces-architecture-diagram.pptx
@@ -16071,7 +16071,7 @@
         </p:nvSpPr>
         <p:spPr>
           <a:xfrm>
-            <a:off x="2926080" y="1463040"/>
+            <a:off x="2971800" y="1463040"/>
             <a:ext cx="5120640" cy="822960"/>
           </a:xfrm>
           <a:prstGeom prst="rect">
@@ -16857,7 +16857,7 @@
         </p:nvSpPr>
         <p:spPr>
           <a:xfrm>
-            <a:off x="2926080" y="3291840"/>
+            <a:off x="2971800" y="3291840"/>
             <a:ext cx="5120640" cy="822960"/>
           </a:xfrm>
           <a:prstGeom prst="rect">
@@ -17010,7 +17010,7 @@
         </p:nvSpPr>
         <p:spPr bwMode="auto">
           <a:xfrm>
-            <a:off x="4845903" y="2836292"/>
+            <a:off x="4845903" y="2834640"/>
             <a:ext cx="1371600" cy="276999"/>
           </a:xfrm>
           <a:prstGeom prst="rect">
@@ -17173,8 +17173,8 @@
         </p:nvCxnSpPr>
         <p:spPr bwMode="auto">
           <a:xfrm flipV="1">
-            <a:off x="5669280" y="4770120"/>
-            <a:ext cx="1188720" cy="1905"/>
+            <a:off x="5715000" y="4770120"/>
+            <a:ext cx="1143000" cy="1905"/>
           </a:xfrm>
           <a:prstGeom prst="straightConnector1">
             <a:avLst/>
@@ -17221,7 +17221,7 @@
         <p:spPr bwMode="auto">
           <a:xfrm>
             <a:off x="4145280" y="4770120"/>
-            <a:ext cx="1066800" cy="1905"/>
+            <a:ext cx="1112520" cy="1905"/>
           </a:xfrm>
           <a:prstGeom prst="straightConnector1">
             <a:avLst/>
@@ -17530,7 +17530,7 @@
         </p:blipFill>
         <p:spPr bwMode="auto">
           <a:xfrm>
-            <a:off x="5212080" y="2377440"/>
+            <a:off x="5257800" y="2377440"/>
             <a:ext cx="457200" cy="457200"/>
           </a:xfrm>
           <a:prstGeom prst="rect">
@@ -18019,7 +18019,7 @@
         </p:nvSpPr>
         <p:spPr bwMode="auto">
           <a:xfrm>
-            <a:off x="4814887" y="5000754"/>
+            <a:off x="4814887" y="5029200"/>
             <a:ext cx="1343025" cy="276999"/>
           </a:xfrm>
           <a:prstGeom prst="rect">
@@ -18193,7 +18193,7 @@
         </p:blipFill>
         <p:spPr bwMode="auto">
           <a:xfrm>
-            <a:off x="5212080" y="4543425"/>
+            <a:off x="5257800" y="4543425"/>
             <a:ext cx="457200" cy="457200"/>
           </a:xfrm>
           <a:prstGeom prst="rect">
@@ -23423,7 +23423,7 @@
         </p:nvSpPr>
         <p:spPr bwMode="auto">
           <a:xfrm>
-            <a:off x="4475687" y="2774904"/>
+            <a:off x="4526280" y="2774904"/>
             <a:ext cx="1920240" cy="276999"/>
           </a:xfrm>
           <a:prstGeom prst="rect">
@@ -25784,7 +25784,7 @@
         </p:nvSpPr>
         <p:spPr bwMode="auto">
           <a:xfrm>
-            <a:off x="4517639" y="5019157"/>
+            <a:off x="4526280" y="5019157"/>
             <a:ext cx="1828800" cy="276999"/>
           </a:xfrm>
           <a:prstGeom prst="rect">
@@ -27860,7 +27860,7 @@
         </p:nvSpPr>
         <p:spPr bwMode="auto">
           <a:xfrm>
-            <a:off x="4515576" y="2080463"/>
+            <a:off x="4515576" y="2011680"/>
             <a:ext cx="1920240" cy="276999"/>
           </a:xfrm>
           <a:prstGeom prst="rect">

</xml_diff>

<commit_message>
TW edits for diagrams
</commit_message>
<xml_diff>
--- a/docs/deployment_guide/images/freeradius-mfa-workspaces-architecture-diagram.pptx
+++ b/docs/deployment_guide/images/freeradius-mfa-workspaces-architecture-diagram.pptx
@@ -15431,20 +15431,28 @@
               <a:defRPr/>
             </a:pPr>
             <a:r>
-              <a:rPr kumimoji="0" lang="en-US" sz="1200" b="0" i="0" u="none" strike="noStrike" kern="1200" cap="none" spc="0" normalizeH="0" baseline="0" noProof="0" dirty="0">
+              <a:rPr lang="en-US" sz="1200">
                 <a:ln w="0"/>
                 <a:solidFill>
-                  <a:srgbClr val="1E8900"/>
-                </a:solidFill>
-                <a:effectLst/>
-                <a:uLnTx/>
-                <a:uFillTx/>
+                  <a:srgbClr val="693BC5"/>
+                </a:solidFill>
                 <a:latin typeface="Arial" panose="020B0604020202020204" pitchFamily="34" charset="0"/>
-                <a:ea typeface="+mn-ea"/>
                 <a:cs typeface="Arial" panose="020B0604020202020204" pitchFamily="34" charset="0"/>
               </a:rPr>
               <a:t>VPC</a:t>
             </a:r>
+            <a:endParaRPr kumimoji="0" lang="en-US" sz="1200" b="0" i="0" u="none" strike="noStrike" kern="1200" cap="none" spc="0" normalizeH="0" baseline="0" noProof="0" dirty="0">
+              <a:ln w="0"/>
+              <a:solidFill>
+                <a:srgbClr val="1E8900"/>
+              </a:solidFill>
+              <a:effectLst/>
+              <a:uLnTx/>
+              <a:uFillTx/>
+              <a:latin typeface="Arial" panose="020B0604020202020204" pitchFamily="34" charset="0"/>
+              <a:ea typeface="+mn-ea"/>
+              <a:cs typeface="Arial" panose="020B0604020202020204" pitchFamily="34" charset="0"/>
+            </a:endParaRPr>
           </a:p>
         </p:txBody>
       </p:sp>
@@ -16021,42 +16029,6 @@
           </a:prstGeom>
         </p:spPr>
       </p:pic>
-      <p:pic>
-        <p:nvPicPr>
-          <p:cNvPr id="39" name="Graphic 38">
-            <a:extLst>
-              <a:ext uri="{FF2B5EF4-FFF2-40B4-BE49-F238E27FC236}">
-                <a16:creationId xmlns:a16="http://schemas.microsoft.com/office/drawing/2014/main" id="{ED425F82-30BD-E14D-A2A7-09E58EE65749}"/>
-              </a:ext>
-            </a:extLst>
-          </p:cNvPr>
-          <p:cNvPicPr>
-            <a:picLocks noChangeAspect="1"/>
-          </p:cNvPicPr>
-          <p:nvPr/>
-        </p:nvPicPr>
-        <p:blipFill>
-          <a:blip r:embed="rId4">
-            <a:extLst>
-              <a:ext uri="{96DAC541-7B7A-43D3-8B79-37D633B846F1}">
-                <asvg:svgBlip xmlns:asvg="http://schemas.microsoft.com/office/drawing/2016/SVG/main" r:embed="rId5"/>
-              </a:ext>
-            </a:extLst>
-          </a:blip>
-          <a:stretch>
-            <a:fillRect/>
-          </a:stretch>
-        </p:blipFill>
-        <p:spPr>
-          <a:xfrm>
-            <a:off x="640080" y="914400"/>
-            <a:ext cx="381000" cy="381000"/>
-          </a:xfrm>
-          <a:prstGeom prst="rect">
-            <a:avLst/>
-          </a:prstGeom>
-        </p:spPr>
-      </p:pic>
       <p:sp>
         <p:nvSpPr>
           <p:cNvPr id="41" name="Rectangle 40">
@@ -16223,10 +16195,10 @@
           <p:nvPr/>
         </p:nvPicPr>
         <p:blipFill>
-          <a:blip r:embed="rId6">
+          <a:blip r:embed="rId4">
             <a:extLst>
               <a:ext uri="{96DAC541-7B7A-43D3-8B79-37D633B846F1}">
-                <asvg:svgBlip xmlns:asvg="http://schemas.microsoft.com/office/drawing/2016/SVG/main" r:embed="rId7"/>
+                <asvg:svgBlip xmlns:asvg="http://schemas.microsoft.com/office/drawing/2016/SVG/main" r:embed="rId5"/>
               </a:ext>
             </a:extLst>
           </a:blip>
@@ -16259,10 +16231,10 @@
           <p:nvPr/>
         </p:nvPicPr>
         <p:blipFill>
-          <a:blip r:embed="rId8">
+          <a:blip r:embed="rId6">
             <a:extLst>
               <a:ext uri="{96DAC541-7B7A-43D3-8B79-37D633B846F1}">
-                <asvg:svgBlip xmlns:asvg="http://schemas.microsoft.com/office/drawing/2016/SVG/main" r:embed="rId9"/>
+                <asvg:svgBlip xmlns:asvg="http://schemas.microsoft.com/office/drawing/2016/SVG/main" r:embed="rId7"/>
               </a:ext>
             </a:extLst>
           </a:blip>
@@ -16612,7 +16584,7 @@
           <p:nvPr/>
         </p:nvPicPr>
         <p:blipFill>
-          <a:blip r:embed="rId10">
+          <a:blip r:embed="rId8">
             <a:extLst>
               <a:ext uri="{28A0092B-C50C-407E-A947-70E740481C1C}">
                 <a14:useLocalDpi xmlns:a14="http://schemas.microsoft.com/office/drawing/2010/main" val="0"/>
@@ -17264,7 +17236,7 @@
           <p:nvPr/>
         </p:nvPicPr>
         <p:blipFill>
-          <a:blip r:embed="rId11">
+          <a:blip r:embed="rId9">
             <a:extLst>
               <a:ext uri="{28A0092B-C50C-407E-A947-70E740481C1C}">
                 <a14:useLocalDpi xmlns:a14="http://schemas.microsoft.com/office/drawing/2010/main" val="0"/>
@@ -17324,10 +17296,10 @@
           <p:nvPr/>
         </p:nvPicPr>
         <p:blipFill>
-          <a:blip r:embed="rId12">
+          <a:blip r:embed="rId10">
             <a:extLst>
               <a:ext uri="{96DAC541-7B7A-43D3-8B79-37D633B846F1}">
-                <asvg:svgBlip xmlns:asvg="http://schemas.microsoft.com/office/drawing/2016/SVG/main" r:embed="rId13"/>
+                <asvg:svgBlip xmlns:asvg="http://schemas.microsoft.com/office/drawing/2016/SVG/main" r:embed="rId11"/>
               </a:ext>
             </a:extLst>
           </a:blip>
@@ -17360,10 +17332,10 @@
           <p:nvPr/>
         </p:nvPicPr>
         <p:blipFill>
-          <a:blip r:embed="rId12">
+          <a:blip r:embed="rId10">
             <a:extLst>
               <a:ext uri="{96DAC541-7B7A-43D3-8B79-37D633B846F1}">
-                <asvg:svgBlip xmlns:asvg="http://schemas.microsoft.com/office/drawing/2016/SVG/main" r:embed="rId13"/>
+                <asvg:svgBlip xmlns:asvg="http://schemas.microsoft.com/office/drawing/2016/SVG/main" r:embed="rId11"/>
               </a:ext>
             </a:extLst>
           </a:blip>
@@ -17396,7 +17368,7 @@
           <p:nvPr/>
         </p:nvPicPr>
         <p:blipFill>
-          <a:blip r:embed="rId10">
+          <a:blip r:embed="rId8">
             <a:extLst>
               <a:ext uri="{28A0092B-C50C-407E-A947-70E740481C1C}">
                 <a14:useLocalDpi xmlns:a14="http://schemas.microsoft.com/office/drawing/2010/main" val="0"/>
@@ -17456,7 +17428,7 @@
           <p:nvPr/>
         </p:nvPicPr>
         <p:blipFill>
-          <a:blip r:embed="rId10">
+          <a:blip r:embed="rId8">
             <a:extLst>
               <a:ext uri="{28A0092B-C50C-407E-A947-70E740481C1C}">
                 <a14:useLocalDpi xmlns:a14="http://schemas.microsoft.com/office/drawing/2010/main" val="0"/>
@@ -17516,7 +17488,7 @@
           <p:nvPr/>
         </p:nvPicPr>
         <p:blipFill>
-          <a:blip r:embed="rId14">
+          <a:blip r:embed="rId12">
             <a:extLst>
               <a:ext uri="{28A0092B-C50C-407E-A947-70E740481C1C}">
                 <a14:useLocalDpi xmlns:a14="http://schemas.microsoft.com/office/drawing/2010/main" val="0"/>
@@ -17576,7 +17548,7 @@
           <p:nvPr/>
         </p:nvPicPr>
         <p:blipFill>
-          <a:blip r:embed="rId15">
+          <a:blip r:embed="rId13">
             <a:extLst>
               <a:ext uri="{28A0092B-C50C-407E-A947-70E740481C1C}">
                 <a14:useLocalDpi xmlns:a14="http://schemas.microsoft.com/office/drawing/2010/main" val="0"/>
@@ -17797,7 +17769,7 @@
           <p:nvPr/>
         </p:nvPicPr>
         <p:blipFill>
-          <a:blip r:embed="rId16">
+          <a:blip r:embed="rId14">
             <a:extLst>
               <a:ext uri="{28A0092B-C50C-407E-A947-70E740481C1C}">
                 <a14:useLocalDpi xmlns:a14="http://schemas.microsoft.com/office/drawing/2010/main" val="0"/>
@@ -18179,7 +18151,7 @@
           <p:nvPr/>
         </p:nvPicPr>
         <p:blipFill>
-          <a:blip r:embed="rId17">
+          <a:blip r:embed="rId15">
             <a:extLst>
               <a:ext uri="{28A0092B-C50C-407E-A947-70E740481C1C}">
                 <a14:useLocalDpi xmlns:a14="http://schemas.microsoft.com/office/drawing/2010/main" val="0"/>
@@ -18239,7 +18211,7 @@
           <p:nvPr/>
         </p:nvPicPr>
         <p:blipFill>
-          <a:blip r:embed="rId18">
+          <a:blip r:embed="rId16">
             <a:extLst>
               <a:ext uri="{28A0092B-C50C-407E-A947-70E740481C1C}">
                 <a14:useLocalDpi xmlns:a14="http://schemas.microsoft.com/office/drawing/2010/main" val="0"/>
@@ -18460,7 +18432,7 @@
           <p:nvPr/>
         </p:nvPicPr>
         <p:blipFill>
-          <a:blip r:embed="rId19">
+          <a:blip r:embed="rId17">
             <a:extLst>
               <a:ext uri="{28A0092B-C50C-407E-A947-70E740481C1C}">
                 <a14:useLocalDpi xmlns:a14="http://schemas.microsoft.com/office/drawing/2010/main" val="0"/>
@@ -18681,7 +18653,7 @@
           <p:nvPr/>
         </p:nvPicPr>
         <p:blipFill>
-          <a:blip r:embed="rId20">
+          <a:blip r:embed="rId18">
             <a:extLst>
               <a:ext uri="{28A0092B-C50C-407E-A947-70E740481C1C}">
                 <a14:useLocalDpi xmlns:a14="http://schemas.microsoft.com/office/drawing/2010/main" val="0"/>
@@ -18902,7 +18874,7 @@
           <p:nvPr/>
         </p:nvPicPr>
         <p:blipFill>
-          <a:blip r:embed="rId21">
+          <a:blip r:embed="rId19">
             <a:extLst>
               <a:ext uri="{28A0092B-C50C-407E-A947-70E740481C1C}">
                 <a14:useLocalDpi xmlns:a14="http://schemas.microsoft.com/office/drawing/2010/main" val="0"/>
@@ -19123,7 +19095,7 @@
           <p:nvPr/>
         </p:nvPicPr>
         <p:blipFill>
-          <a:blip r:embed="rId22">
+          <a:blip r:embed="rId20">
             <a:extLst>
               <a:ext uri="{28A0092B-C50C-407E-A947-70E740481C1C}">
                 <a14:useLocalDpi xmlns:a14="http://schemas.microsoft.com/office/drawing/2010/main" val="0"/>
@@ -19860,10 +19832,10 @@
           <p:nvPr/>
         </p:nvPicPr>
         <p:blipFill>
-          <a:blip r:embed="rId6">
+          <a:blip r:embed="rId4">
             <a:extLst>
               <a:ext uri="{96DAC541-7B7A-43D3-8B79-37D633B846F1}">
-                <asvg:svgBlip xmlns:asvg="http://schemas.microsoft.com/office/drawing/2016/SVG/main" r:embed="rId7"/>
+                <asvg:svgBlip xmlns:asvg="http://schemas.microsoft.com/office/drawing/2016/SVG/main" r:embed="rId5"/>
               </a:ext>
             </a:extLst>
           </a:blip>
@@ -19896,10 +19868,10 @@
           <p:nvPr/>
         </p:nvPicPr>
         <p:blipFill>
-          <a:blip r:embed="rId8">
+          <a:blip r:embed="rId6">
             <a:extLst>
               <a:ext uri="{96DAC541-7B7A-43D3-8B79-37D633B846F1}">
-                <asvg:svgBlip xmlns:asvg="http://schemas.microsoft.com/office/drawing/2016/SVG/main" r:embed="rId9"/>
+                <asvg:svgBlip xmlns:asvg="http://schemas.microsoft.com/office/drawing/2016/SVG/main" r:embed="rId7"/>
               </a:ext>
             </a:extLst>
           </a:blip>
@@ -20154,7 +20126,7 @@
           <p:nvPr/>
         </p:nvPicPr>
         <p:blipFill>
-          <a:blip r:embed="rId10">
+          <a:blip r:embed="rId8">
             <a:extLst>
               <a:ext uri="{28A0092B-C50C-407E-A947-70E740481C1C}">
                 <a14:useLocalDpi xmlns:a14="http://schemas.microsoft.com/office/drawing/2010/main" val="0"/>
@@ -20400,7 +20372,7 @@
           <p:nvPr/>
         </p:nvPicPr>
         <p:blipFill>
-          <a:blip r:embed="rId11">
+          <a:blip r:embed="rId9">
             <a:extLst>
               <a:ext uri="{28A0092B-C50C-407E-A947-70E740481C1C}">
                 <a14:useLocalDpi xmlns:a14="http://schemas.microsoft.com/office/drawing/2010/main" val="0"/>
@@ -20460,7 +20432,7 @@
           <p:nvPr/>
         </p:nvPicPr>
         <p:blipFill>
-          <a:blip r:embed="rId10">
+          <a:blip r:embed="rId8">
             <a:extLst>
               <a:ext uri="{28A0092B-C50C-407E-A947-70E740481C1C}">
                 <a14:useLocalDpi xmlns:a14="http://schemas.microsoft.com/office/drawing/2010/main" val="0"/>
@@ -20520,7 +20492,7 @@
           <p:nvPr/>
         </p:nvPicPr>
         <p:blipFill>
-          <a:blip r:embed="rId10">
+          <a:blip r:embed="rId8">
             <a:extLst>
               <a:ext uri="{28A0092B-C50C-407E-A947-70E740481C1C}">
                 <a14:useLocalDpi xmlns:a14="http://schemas.microsoft.com/office/drawing/2010/main" val="0"/>
@@ -20580,7 +20552,7 @@
           <p:nvPr/>
         </p:nvPicPr>
         <p:blipFill>
-          <a:blip r:embed="rId16">
+          <a:blip r:embed="rId14">
             <a:extLst>
               <a:ext uri="{28A0092B-C50C-407E-A947-70E740481C1C}">
                 <a14:useLocalDpi xmlns:a14="http://schemas.microsoft.com/office/drawing/2010/main" val="0"/>
@@ -20786,6 +20758,41 @@
           </a:p>
         </p:txBody>
       </p:sp>
+      <p:pic>
+        <p:nvPicPr>
+          <p:cNvPr id="59" name="Graphic 58">
+            <a:extLst>
+              <a:ext uri="{FF2B5EF4-FFF2-40B4-BE49-F238E27FC236}">
+                <a16:creationId xmlns:a16="http://schemas.microsoft.com/office/drawing/2014/main" id="{8F1A3287-D728-4B56-A936-B21B8BECEFB2}"/>
+              </a:ext>
+            </a:extLst>
+          </p:cNvPr>
+          <p:cNvPicPr>
+            <a:picLocks noChangeAspect="1"/>
+          </p:cNvPicPr>
+          <p:nvPr/>
+        </p:nvPicPr>
+        <p:blipFill>
+          <a:blip r:embed="rId21">
+            <a:extLst>
+              <a:ext uri="{96DAC541-7B7A-43D3-8B79-37D633B846F1}">
+                <asvg:svgBlip xmlns:asvg="http://schemas.microsoft.com/office/drawing/2016/SVG/main" r:embed="rId22"/>
+              </a:ext>
+            </a:extLst>
+          </a:blip>
+          <a:srcRect/>
+          <a:stretch/>
+        </p:blipFill>
+        <p:spPr>
+          <a:xfrm>
+            <a:off x="640080" y="914400"/>
+            <a:ext cx="381000" cy="381000"/>
+          </a:xfrm>
+          <a:prstGeom prst="rect">
+            <a:avLst/>
+          </a:prstGeom>
+        </p:spPr>
+      </p:pic>
     </p:spTree>
     <p:extLst>
       <p:ext uri="{BB962C8B-B14F-4D97-AF65-F5344CB8AC3E}">
@@ -21025,20 +21032,28 @@
               <a:defRPr/>
             </a:pPr>
             <a:r>
-              <a:rPr kumimoji="0" lang="en-US" sz="1200" b="0" i="0" u="none" strike="noStrike" kern="1200" cap="none" spc="0" normalizeH="0" baseline="0" noProof="0" dirty="0">
+              <a:rPr lang="en-US" sz="1200" dirty="0">
                 <a:ln w="0"/>
                 <a:solidFill>
-                  <a:srgbClr val="1E8900"/>
-                </a:solidFill>
-                <a:effectLst/>
-                <a:uLnTx/>
-                <a:uFillTx/>
+                  <a:srgbClr val="693BC5"/>
+                </a:solidFill>
                 <a:latin typeface="Arial" panose="020B0604020202020204" pitchFamily="34" charset="0"/>
-                <a:ea typeface="+mn-ea"/>
                 <a:cs typeface="Arial" panose="020B0604020202020204" pitchFamily="34" charset="0"/>
               </a:rPr>
               <a:t>VPC</a:t>
             </a:r>
+            <a:endParaRPr kumimoji="0" lang="en-US" sz="1200" b="0" i="0" u="none" strike="noStrike" kern="1200" cap="none" spc="0" normalizeH="0" baseline="0" noProof="0" dirty="0">
+              <a:ln w="0"/>
+              <a:solidFill>
+                <a:srgbClr val="1E8900"/>
+              </a:solidFill>
+              <a:effectLst/>
+              <a:uLnTx/>
+              <a:uFillTx/>
+              <a:latin typeface="Arial" panose="020B0604020202020204" pitchFamily="34" charset="0"/>
+              <a:ea typeface="+mn-ea"/>
+              <a:cs typeface="Arial" panose="020B0604020202020204" pitchFamily="34" charset="0"/>
+            </a:endParaRPr>
           </a:p>
         </p:txBody>
       </p:sp>
@@ -21615,42 +21630,6 @@
           </a:prstGeom>
         </p:spPr>
       </p:pic>
-      <p:pic>
-        <p:nvPicPr>
-          <p:cNvPr id="15" name="Graphic 14">
-            <a:extLst>
-              <a:ext uri="{FF2B5EF4-FFF2-40B4-BE49-F238E27FC236}">
-                <a16:creationId xmlns:a16="http://schemas.microsoft.com/office/drawing/2014/main" id="{8DF89995-C86B-15FF-BD5F-66957026DBFD}"/>
-              </a:ext>
-            </a:extLst>
-          </p:cNvPr>
-          <p:cNvPicPr>
-            <a:picLocks noChangeAspect="1"/>
-          </p:cNvPicPr>
-          <p:nvPr/>
-        </p:nvPicPr>
-        <p:blipFill>
-          <a:blip r:embed="rId4">
-            <a:extLst>
-              <a:ext uri="{96DAC541-7B7A-43D3-8B79-37D633B846F1}">
-                <asvg:svgBlip xmlns:asvg="http://schemas.microsoft.com/office/drawing/2016/SVG/main" r:embed="rId5"/>
-              </a:ext>
-            </a:extLst>
-          </a:blip>
-          <a:stretch>
-            <a:fillRect/>
-          </a:stretch>
-        </p:blipFill>
-        <p:spPr>
-          <a:xfrm>
-            <a:off x="640080" y="914400"/>
-            <a:ext cx="381000" cy="381000"/>
-          </a:xfrm>
-          <a:prstGeom prst="rect">
-            <a:avLst/>
-          </a:prstGeom>
-        </p:spPr>
-      </p:pic>
       <p:sp>
         <p:nvSpPr>
           <p:cNvPr id="16" name="Rectangle 15">
@@ -21817,10 +21796,10 @@
           <p:nvPr/>
         </p:nvPicPr>
         <p:blipFill>
-          <a:blip r:embed="rId6">
+          <a:blip r:embed="rId4">
             <a:extLst>
               <a:ext uri="{96DAC541-7B7A-43D3-8B79-37D633B846F1}">
-                <asvg:svgBlip xmlns:asvg="http://schemas.microsoft.com/office/drawing/2016/SVG/main" r:embed="rId7"/>
+                <asvg:svgBlip xmlns:asvg="http://schemas.microsoft.com/office/drawing/2016/SVG/main" r:embed="rId5"/>
               </a:ext>
             </a:extLst>
           </a:blip>
@@ -21853,10 +21832,10 @@
           <p:nvPr/>
         </p:nvPicPr>
         <p:blipFill>
-          <a:blip r:embed="rId8">
+          <a:blip r:embed="rId6">
             <a:extLst>
               <a:ext uri="{96DAC541-7B7A-43D3-8B79-37D633B846F1}">
-                <asvg:svgBlip xmlns:asvg="http://schemas.microsoft.com/office/drawing/2016/SVG/main" r:embed="rId9"/>
+                <asvg:svgBlip xmlns:asvg="http://schemas.microsoft.com/office/drawing/2016/SVG/main" r:embed="rId7"/>
               </a:ext>
             </a:extLst>
           </a:blip>
@@ -22304,10 +22283,10 @@
           <p:nvPr/>
         </p:nvPicPr>
         <p:blipFill>
-          <a:blip r:embed="rId6">
+          <a:blip r:embed="rId4">
             <a:extLst>
               <a:ext uri="{96DAC541-7B7A-43D3-8B79-37D633B846F1}">
-                <asvg:svgBlip xmlns:asvg="http://schemas.microsoft.com/office/drawing/2016/SVG/main" r:embed="rId7"/>
+                <asvg:svgBlip xmlns:asvg="http://schemas.microsoft.com/office/drawing/2016/SVG/main" r:embed="rId5"/>
               </a:ext>
             </a:extLst>
           </a:blip>
@@ -22340,10 +22319,10 @@
           <p:nvPr/>
         </p:nvPicPr>
         <p:blipFill>
-          <a:blip r:embed="rId8">
+          <a:blip r:embed="rId6">
             <a:extLst>
               <a:ext uri="{96DAC541-7B7A-43D3-8B79-37D633B846F1}">
-                <asvg:svgBlip xmlns:asvg="http://schemas.microsoft.com/office/drawing/2016/SVG/main" r:embed="rId9"/>
+                <asvg:svgBlip xmlns:asvg="http://schemas.microsoft.com/office/drawing/2016/SVG/main" r:embed="rId7"/>
               </a:ext>
             </a:extLst>
           </a:blip>
@@ -22779,7 +22758,7 @@
           <p:nvPr/>
         </p:nvPicPr>
         <p:blipFill>
-          <a:blip r:embed="rId10">
+          <a:blip r:embed="rId8">
             <a:extLst>
               <a:ext uri="{28A0092B-C50C-407E-A947-70E740481C1C}">
                 <a14:useLocalDpi xmlns:a14="http://schemas.microsoft.com/office/drawing/2010/main" val="0"/>
@@ -23025,7 +23004,7 @@
           <p:nvPr/>
         </p:nvPicPr>
         <p:blipFill>
-          <a:blip r:embed="rId10">
+          <a:blip r:embed="rId8">
             <a:extLst>
               <a:ext uri="{28A0092B-C50C-407E-A947-70E740481C1C}">
                 <a14:useLocalDpi xmlns:a14="http://schemas.microsoft.com/office/drawing/2010/main" val="0"/>
@@ -23583,7 +23562,7 @@
           <p:nvPr/>
         </p:nvPicPr>
         <p:blipFill>
-          <a:blip r:embed="rId11">
+          <a:blip r:embed="rId9">
             <a:extLst>
               <a:ext uri="{28A0092B-C50C-407E-A947-70E740481C1C}">
                 <a14:useLocalDpi xmlns:a14="http://schemas.microsoft.com/office/drawing/2010/main" val="0"/>
@@ -23643,10 +23622,10 @@
           <p:nvPr/>
         </p:nvPicPr>
         <p:blipFill>
-          <a:blip r:embed="rId12">
+          <a:blip r:embed="rId10">
             <a:extLst>
               <a:ext uri="{96DAC541-7B7A-43D3-8B79-37D633B846F1}">
-                <asvg:svgBlip xmlns:asvg="http://schemas.microsoft.com/office/drawing/2016/SVG/main" r:embed="rId13"/>
+                <asvg:svgBlip xmlns:asvg="http://schemas.microsoft.com/office/drawing/2016/SVG/main" r:embed="rId11"/>
               </a:ext>
             </a:extLst>
           </a:blip>
@@ -23679,10 +23658,10 @@
           <p:nvPr/>
         </p:nvPicPr>
         <p:blipFill>
-          <a:blip r:embed="rId12">
+          <a:blip r:embed="rId10">
             <a:extLst>
               <a:ext uri="{96DAC541-7B7A-43D3-8B79-37D633B846F1}">
-                <asvg:svgBlip xmlns:asvg="http://schemas.microsoft.com/office/drawing/2016/SVG/main" r:embed="rId13"/>
+                <asvg:svgBlip xmlns:asvg="http://schemas.microsoft.com/office/drawing/2016/SVG/main" r:embed="rId11"/>
               </a:ext>
             </a:extLst>
           </a:blip>
@@ -23715,7 +23694,7 @@
           <p:nvPr/>
         </p:nvPicPr>
         <p:blipFill>
-          <a:blip r:embed="rId11">
+          <a:blip r:embed="rId9">
             <a:extLst>
               <a:ext uri="{28A0092B-C50C-407E-A947-70E740481C1C}">
                 <a14:useLocalDpi xmlns:a14="http://schemas.microsoft.com/office/drawing/2010/main" val="0"/>
@@ -23775,7 +23754,7 @@
           <p:nvPr/>
         </p:nvPicPr>
         <p:blipFill>
-          <a:blip r:embed="rId10">
+          <a:blip r:embed="rId8">
             <a:extLst>
               <a:ext uri="{28A0092B-C50C-407E-A947-70E740481C1C}">
                 <a14:useLocalDpi xmlns:a14="http://schemas.microsoft.com/office/drawing/2010/main" val="0"/>
@@ -23835,7 +23814,7 @@
           <p:nvPr/>
         </p:nvPicPr>
         <p:blipFill>
-          <a:blip r:embed="rId10">
+          <a:blip r:embed="rId8">
             <a:extLst>
               <a:ext uri="{28A0092B-C50C-407E-A947-70E740481C1C}">
                 <a14:useLocalDpi xmlns:a14="http://schemas.microsoft.com/office/drawing/2010/main" val="0"/>
@@ -23895,7 +23874,7 @@
           <p:nvPr/>
         </p:nvPicPr>
         <p:blipFill>
-          <a:blip r:embed="rId10">
+          <a:blip r:embed="rId8">
             <a:extLst>
               <a:ext uri="{28A0092B-C50C-407E-A947-70E740481C1C}">
                 <a14:useLocalDpi xmlns:a14="http://schemas.microsoft.com/office/drawing/2010/main" val="0"/>
@@ -23955,7 +23934,7 @@
           <p:nvPr/>
         </p:nvPicPr>
         <p:blipFill>
-          <a:blip r:embed="rId14">
+          <a:blip r:embed="rId12">
             <a:extLst>
               <a:ext uri="{28A0092B-C50C-407E-A947-70E740481C1C}">
                 <a14:useLocalDpi xmlns:a14="http://schemas.microsoft.com/office/drawing/2010/main" val="0"/>
@@ -24015,7 +23994,7 @@
           <p:nvPr/>
         </p:nvPicPr>
         <p:blipFill>
-          <a:blip r:embed="rId15">
+          <a:blip r:embed="rId13">
             <a:extLst>
               <a:ext uri="{28A0092B-C50C-407E-A947-70E740481C1C}">
                 <a14:useLocalDpi xmlns:a14="http://schemas.microsoft.com/office/drawing/2010/main" val="0"/>
@@ -24236,7 +24215,7 @@
           <p:nvPr/>
         </p:nvPicPr>
         <p:blipFill>
-          <a:blip r:embed="rId16">
+          <a:blip r:embed="rId14">
             <a:extLst>
               <a:ext uri="{28A0092B-C50C-407E-A947-70E740481C1C}">
                 <a14:useLocalDpi xmlns:a14="http://schemas.microsoft.com/office/drawing/2010/main" val="0"/>
@@ -24457,7 +24436,7 @@
           <p:nvPr/>
         </p:nvPicPr>
         <p:blipFill>
-          <a:blip r:embed="rId16">
+          <a:blip r:embed="rId14">
             <a:extLst>
               <a:ext uri="{28A0092B-C50C-407E-A947-70E740481C1C}">
                 <a14:useLocalDpi xmlns:a14="http://schemas.microsoft.com/office/drawing/2010/main" val="0"/>
@@ -24678,7 +24657,7 @@
           <p:nvPr/>
         </p:nvPicPr>
         <p:blipFill>
-          <a:blip r:embed="rId17">
+          <a:blip r:embed="rId15">
             <a:extLst>
               <a:ext uri="{28A0092B-C50C-407E-A947-70E740481C1C}">
                 <a14:useLocalDpi xmlns:a14="http://schemas.microsoft.com/office/drawing/2010/main" val="0"/>
@@ -24899,7 +24878,7 @@
           <p:nvPr/>
         </p:nvPicPr>
         <p:blipFill>
-          <a:blip r:embed="rId18">
+          <a:blip r:embed="rId16">
             <a:extLst>
               <a:ext uri="{28A0092B-C50C-407E-A947-70E740481C1C}">
                 <a14:useLocalDpi xmlns:a14="http://schemas.microsoft.com/office/drawing/2010/main" val="0"/>
@@ -25120,7 +25099,7 @@
           <p:nvPr/>
         </p:nvPicPr>
         <p:blipFill>
-          <a:blip r:embed="rId19">
+          <a:blip r:embed="rId17">
             <a:extLst>
               <a:ext uri="{28A0092B-C50C-407E-A947-70E740481C1C}">
                 <a14:useLocalDpi xmlns:a14="http://schemas.microsoft.com/office/drawing/2010/main" val="0"/>
@@ -25341,7 +25320,7 @@
           <p:nvPr/>
         </p:nvPicPr>
         <p:blipFill>
-          <a:blip r:embed="rId20">
+          <a:blip r:embed="rId18">
             <a:extLst>
               <a:ext uri="{28A0092B-C50C-407E-A947-70E740481C1C}">
                 <a14:useLocalDpi xmlns:a14="http://schemas.microsoft.com/office/drawing/2010/main" val="0"/>
@@ -25562,7 +25541,7 @@
           <p:nvPr/>
         </p:nvPicPr>
         <p:blipFill>
-          <a:blip r:embed="rId21">
+          <a:blip r:embed="rId19">
             <a:extLst>
               <a:ext uri="{28A0092B-C50C-407E-A947-70E740481C1C}">
                 <a14:useLocalDpi xmlns:a14="http://schemas.microsoft.com/office/drawing/2010/main" val="0"/>
@@ -25944,7 +25923,7 @@
           <p:nvPr/>
         </p:nvPicPr>
         <p:blipFill>
-          <a:blip r:embed="rId22">
+          <a:blip r:embed="rId20">
             <a:extLst>
               <a:ext uri="{28A0092B-C50C-407E-A947-70E740481C1C}">
                 <a14:useLocalDpi xmlns:a14="http://schemas.microsoft.com/office/drawing/2010/main" val="0"/>
@@ -26083,6 +26062,41 @@
           </a:fontRef>
         </p:style>
       </p:cxnSp>
+      <p:pic>
+        <p:nvPicPr>
+          <p:cNvPr id="56" name="Graphic 55">
+            <a:extLst>
+              <a:ext uri="{FF2B5EF4-FFF2-40B4-BE49-F238E27FC236}">
+                <a16:creationId xmlns:a16="http://schemas.microsoft.com/office/drawing/2014/main" id="{76375091-B819-43AE-B05C-4E314A4A16AC}"/>
+              </a:ext>
+            </a:extLst>
+          </p:cNvPr>
+          <p:cNvPicPr>
+            <a:picLocks noChangeAspect="1"/>
+          </p:cNvPicPr>
+          <p:nvPr/>
+        </p:nvPicPr>
+        <p:blipFill>
+          <a:blip r:embed="rId21">
+            <a:extLst>
+              <a:ext uri="{96DAC541-7B7A-43D3-8B79-37D633B846F1}">
+                <asvg:svgBlip xmlns:asvg="http://schemas.microsoft.com/office/drawing/2016/SVG/main" r:embed="rId22"/>
+              </a:ext>
+            </a:extLst>
+          </a:blip>
+          <a:srcRect/>
+          <a:stretch/>
+        </p:blipFill>
+        <p:spPr>
+          <a:xfrm>
+            <a:off x="640080" y="914400"/>
+            <a:ext cx="381000" cy="381000"/>
+          </a:xfrm>
+          <a:prstGeom prst="rect">
+            <a:avLst/>
+          </a:prstGeom>
+        </p:spPr>
+      </p:pic>
     </p:spTree>
     <p:extLst>
       <p:ext uri="{BB962C8B-B14F-4D97-AF65-F5344CB8AC3E}">
@@ -26322,20 +26336,28 @@
               <a:defRPr/>
             </a:pPr>
             <a:r>
-              <a:rPr kumimoji="0" lang="en-US" sz="1200" b="0" i="0" u="none" strike="noStrike" kern="1200" cap="none" spc="0" normalizeH="0" baseline="0" noProof="0" dirty="0">
+              <a:rPr lang="en-US" sz="1200" dirty="0">
                 <a:ln w="0"/>
                 <a:solidFill>
-                  <a:srgbClr val="1E8900"/>
-                </a:solidFill>
-                <a:effectLst/>
-                <a:uLnTx/>
-                <a:uFillTx/>
+                  <a:srgbClr val="693BC5"/>
+                </a:solidFill>
                 <a:latin typeface="Arial" panose="020B0604020202020204" pitchFamily="34" charset="0"/>
-                <a:ea typeface="+mn-ea"/>
                 <a:cs typeface="Arial" panose="020B0604020202020204" pitchFamily="34" charset="0"/>
               </a:rPr>
               <a:t>VPC</a:t>
             </a:r>
+            <a:endParaRPr kumimoji="0" lang="en-US" sz="1200" b="0" i="0" u="none" strike="noStrike" kern="1200" cap="none" spc="0" normalizeH="0" baseline="0" noProof="0" dirty="0">
+              <a:ln w="0"/>
+              <a:solidFill>
+                <a:srgbClr val="1E8900"/>
+              </a:solidFill>
+              <a:effectLst/>
+              <a:uLnTx/>
+              <a:uFillTx/>
+              <a:latin typeface="Arial" panose="020B0604020202020204" pitchFamily="34" charset="0"/>
+              <a:ea typeface="+mn-ea"/>
+              <a:cs typeface="Arial" panose="020B0604020202020204" pitchFamily="34" charset="0"/>
+            </a:endParaRPr>
           </a:p>
         </p:txBody>
       </p:sp>
@@ -26914,10 +26936,10 @@
       </p:pic>
       <p:pic>
         <p:nvPicPr>
-          <p:cNvPr id="39" name="Graphic 38">
-            <a:extLst>
-              <a:ext uri="{FF2B5EF4-FFF2-40B4-BE49-F238E27FC236}">
-                <a16:creationId xmlns:a16="http://schemas.microsoft.com/office/drawing/2014/main" id="{ED425F82-30BD-E14D-A2A7-09E58EE65749}"/>
+          <p:cNvPr id="49" name="Graphic 48">
+            <a:extLst>
+              <a:ext uri="{FF2B5EF4-FFF2-40B4-BE49-F238E27FC236}">
+                <a16:creationId xmlns:a16="http://schemas.microsoft.com/office/drawing/2014/main" id="{F88FDB8F-EE69-CA4C-BA7D-77D1617E7A7A}"/>
               </a:ext>
             </a:extLst>
           </p:cNvPr>
@@ -26940,8 +26962,8 @@
         </p:blipFill>
         <p:spPr>
           <a:xfrm>
-            <a:off x="640080" y="914400"/>
-            <a:ext cx="381000" cy="381000"/>
+            <a:off x="1737360" y="1097280"/>
+            <a:ext cx="384048" cy="384048"/>
           </a:xfrm>
           <a:prstGeom prst="rect">
             <a:avLst/>
@@ -26950,10 +26972,10 @@
       </p:pic>
       <p:pic>
         <p:nvPicPr>
-          <p:cNvPr id="49" name="Graphic 48">
-            <a:extLst>
-              <a:ext uri="{FF2B5EF4-FFF2-40B4-BE49-F238E27FC236}">
-                <a16:creationId xmlns:a16="http://schemas.microsoft.com/office/drawing/2014/main" id="{F88FDB8F-EE69-CA4C-BA7D-77D1617E7A7A}"/>
+          <p:cNvPr id="50" name="Graphic 49">
+            <a:extLst>
+              <a:ext uri="{FF2B5EF4-FFF2-40B4-BE49-F238E27FC236}">
+                <a16:creationId xmlns:a16="http://schemas.microsoft.com/office/drawing/2014/main" id="{99CEE759-5B3C-F34D-A7E1-8309D1A608E9}"/>
               </a:ext>
             </a:extLst>
           </p:cNvPr>
@@ -26967,42 +26989,6 @@
             <a:extLst>
               <a:ext uri="{96DAC541-7B7A-43D3-8B79-37D633B846F1}">
                 <asvg:svgBlip xmlns:asvg="http://schemas.microsoft.com/office/drawing/2016/SVG/main" r:embed="rId7"/>
-              </a:ext>
-            </a:extLst>
-          </a:blip>
-          <a:stretch>
-            <a:fillRect/>
-          </a:stretch>
-        </p:blipFill>
-        <p:spPr>
-          <a:xfrm>
-            <a:off x="1737360" y="1097280"/>
-            <a:ext cx="384048" cy="384048"/>
-          </a:xfrm>
-          <a:prstGeom prst="rect">
-            <a:avLst/>
-          </a:prstGeom>
-        </p:spPr>
-      </p:pic>
-      <p:pic>
-        <p:nvPicPr>
-          <p:cNvPr id="50" name="Graphic 49">
-            <a:extLst>
-              <a:ext uri="{FF2B5EF4-FFF2-40B4-BE49-F238E27FC236}">
-                <a16:creationId xmlns:a16="http://schemas.microsoft.com/office/drawing/2014/main" id="{99CEE759-5B3C-F34D-A7E1-8309D1A608E9}"/>
-              </a:ext>
-            </a:extLst>
-          </p:cNvPr>
-          <p:cNvPicPr>
-            <a:picLocks noChangeAspect="1"/>
-          </p:cNvPicPr>
-          <p:nvPr/>
-        </p:nvPicPr>
-        <p:blipFill>
-          <a:blip r:embed="rId8">
-            <a:extLst>
-              <a:ext uri="{96DAC541-7B7A-43D3-8B79-37D633B846F1}">
-                <asvg:svgBlip xmlns:asvg="http://schemas.microsoft.com/office/drawing/2016/SVG/main" r:embed="rId9"/>
               </a:ext>
             </a:extLst>
           </a:blip>
@@ -27450,10 +27436,10 @@
           <p:nvPr/>
         </p:nvPicPr>
         <p:blipFill>
-          <a:blip r:embed="rId6">
+          <a:blip r:embed="rId4">
             <a:extLst>
               <a:ext uri="{96DAC541-7B7A-43D3-8B79-37D633B846F1}">
-                <asvg:svgBlip xmlns:asvg="http://schemas.microsoft.com/office/drawing/2016/SVG/main" r:embed="rId7"/>
+                <asvg:svgBlip xmlns:asvg="http://schemas.microsoft.com/office/drawing/2016/SVG/main" r:embed="rId5"/>
               </a:ext>
             </a:extLst>
           </a:blip>
@@ -27486,10 +27472,10 @@
           <p:nvPr/>
         </p:nvPicPr>
         <p:blipFill>
-          <a:blip r:embed="rId8">
+          <a:blip r:embed="rId6">
             <a:extLst>
               <a:ext uri="{96DAC541-7B7A-43D3-8B79-37D633B846F1}">
-                <asvg:svgBlip xmlns:asvg="http://schemas.microsoft.com/office/drawing/2016/SVG/main" r:embed="rId9"/>
+                <asvg:svgBlip xmlns:asvg="http://schemas.microsoft.com/office/drawing/2016/SVG/main" r:embed="rId7"/>
               </a:ext>
             </a:extLst>
           </a:blip>
@@ -28114,7 +28100,7 @@
           <p:nvPr/>
         </p:nvPicPr>
         <p:blipFill>
-          <a:blip r:embed="rId10">
+          <a:blip r:embed="rId8">
             <a:extLst>
               <a:ext uri="{28A0092B-C50C-407E-A947-70E740481C1C}">
                 <a14:useLocalDpi xmlns:a14="http://schemas.microsoft.com/office/drawing/2010/main" val="0"/>
@@ -28174,10 +28160,10 @@
           <p:nvPr/>
         </p:nvPicPr>
         <p:blipFill>
-          <a:blip r:embed="rId11">
+          <a:blip r:embed="rId9">
             <a:extLst>
               <a:ext uri="{96DAC541-7B7A-43D3-8B79-37D633B846F1}">
-                <asvg:svgBlip xmlns:asvg="http://schemas.microsoft.com/office/drawing/2016/SVG/main" r:embed="rId12"/>
+                <asvg:svgBlip xmlns:asvg="http://schemas.microsoft.com/office/drawing/2016/SVG/main" r:embed="rId10"/>
               </a:ext>
             </a:extLst>
           </a:blip>
@@ -28210,7 +28196,7 @@
           <p:nvPr/>
         </p:nvPicPr>
         <p:blipFill>
-          <a:blip r:embed="rId10">
+          <a:blip r:embed="rId8">
             <a:extLst>
               <a:ext uri="{28A0092B-C50C-407E-A947-70E740481C1C}">
                 <a14:useLocalDpi xmlns:a14="http://schemas.microsoft.com/office/drawing/2010/main" val="0"/>
@@ -28270,7 +28256,7 @@
           <p:nvPr/>
         </p:nvPicPr>
         <p:blipFill>
-          <a:blip r:embed="rId13">
+          <a:blip r:embed="rId11">
             <a:extLst>
               <a:ext uri="{28A0092B-C50C-407E-A947-70E740481C1C}">
                 <a14:useLocalDpi xmlns:a14="http://schemas.microsoft.com/office/drawing/2010/main" val="0"/>
@@ -28330,7 +28316,7 @@
           <p:nvPr/>
         </p:nvPicPr>
         <p:blipFill>
-          <a:blip r:embed="rId13">
+          <a:blip r:embed="rId11">
             <a:extLst>
               <a:ext uri="{28A0092B-C50C-407E-A947-70E740481C1C}">
                 <a14:useLocalDpi xmlns:a14="http://schemas.microsoft.com/office/drawing/2010/main" val="0"/>
@@ -28390,7 +28376,7 @@
           <p:nvPr/>
         </p:nvPicPr>
         <p:blipFill>
-          <a:blip r:embed="rId14">
+          <a:blip r:embed="rId12">
             <a:extLst>
               <a:ext uri="{28A0092B-C50C-407E-A947-70E740481C1C}">
                 <a14:useLocalDpi xmlns:a14="http://schemas.microsoft.com/office/drawing/2010/main" val="0"/>
@@ -28450,7 +28436,7 @@
           <p:nvPr/>
         </p:nvPicPr>
         <p:blipFill>
-          <a:blip r:embed="rId15">
+          <a:blip r:embed="rId13">
             <a:extLst>
               <a:ext uri="{28A0092B-C50C-407E-A947-70E740481C1C}">
                 <a14:useLocalDpi xmlns:a14="http://schemas.microsoft.com/office/drawing/2010/main" val="0"/>
@@ -28671,7 +28657,7 @@
           <p:nvPr/>
         </p:nvPicPr>
         <p:blipFill>
-          <a:blip r:embed="rId16">
+          <a:blip r:embed="rId14">
             <a:extLst>
               <a:ext uri="{28A0092B-C50C-407E-A947-70E740481C1C}">
                 <a14:useLocalDpi xmlns:a14="http://schemas.microsoft.com/office/drawing/2010/main" val="0"/>
@@ -28892,7 +28878,7 @@
           <p:nvPr/>
         </p:nvPicPr>
         <p:blipFill>
-          <a:blip r:embed="rId16">
+          <a:blip r:embed="rId14">
             <a:extLst>
               <a:ext uri="{28A0092B-C50C-407E-A947-70E740481C1C}">
                 <a14:useLocalDpi xmlns:a14="http://schemas.microsoft.com/office/drawing/2010/main" val="0"/>
@@ -29113,7 +29099,7 @@
           <p:nvPr/>
         </p:nvPicPr>
         <p:blipFill>
-          <a:blip r:embed="rId17">
+          <a:blip r:embed="rId15">
             <a:extLst>
               <a:ext uri="{28A0092B-C50C-407E-A947-70E740481C1C}">
                 <a14:useLocalDpi xmlns:a14="http://schemas.microsoft.com/office/drawing/2010/main" val="0"/>
@@ -29334,7 +29320,7 @@
           <p:nvPr/>
         </p:nvPicPr>
         <p:blipFill>
-          <a:blip r:embed="rId18">
+          <a:blip r:embed="rId16">
             <a:extLst>
               <a:ext uri="{28A0092B-C50C-407E-A947-70E740481C1C}">
                 <a14:useLocalDpi xmlns:a14="http://schemas.microsoft.com/office/drawing/2010/main" val="0"/>
@@ -29555,7 +29541,7 @@
           <p:nvPr/>
         </p:nvPicPr>
         <p:blipFill>
-          <a:blip r:embed="rId19">
+          <a:blip r:embed="rId17">
             <a:extLst>
               <a:ext uri="{28A0092B-C50C-407E-A947-70E740481C1C}">
                 <a14:useLocalDpi xmlns:a14="http://schemas.microsoft.com/office/drawing/2010/main" val="0"/>
@@ -29776,7 +29762,7 @@
           <p:nvPr/>
         </p:nvPicPr>
         <p:blipFill>
-          <a:blip r:embed="rId20">
+          <a:blip r:embed="rId18">
             <a:extLst>
               <a:ext uri="{28A0092B-C50C-407E-A947-70E740481C1C}">
                 <a14:useLocalDpi xmlns:a14="http://schemas.microsoft.com/office/drawing/2010/main" val="0"/>
@@ -29997,7 +29983,7 @@
           <p:nvPr/>
         </p:nvPicPr>
         <p:blipFill>
-          <a:blip r:embed="rId21">
+          <a:blip r:embed="rId19">
             <a:extLst>
               <a:ext uri="{28A0092B-C50C-407E-A947-70E740481C1C}">
                 <a14:useLocalDpi xmlns:a14="http://schemas.microsoft.com/office/drawing/2010/main" val="0"/>
@@ -30218,7 +30204,7 @@
           <p:nvPr/>
         </p:nvPicPr>
         <p:blipFill>
-          <a:blip r:embed="rId22">
+          <a:blip r:embed="rId20">
             <a:extLst>
               <a:ext uri="{28A0092B-C50C-407E-A947-70E740481C1C}">
                 <a14:useLocalDpi xmlns:a14="http://schemas.microsoft.com/office/drawing/2010/main" val="0"/>
@@ -30424,6 +30410,41 @@
           </a:p>
         </p:txBody>
       </p:sp>
+      <p:pic>
+        <p:nvPicPr>
+          <p:cNvPr id="51" name="Graphic 50">
+            <a:extLst>
+              <a:ext uri="{FF2B5EF4-FFF2-40B4-BE49-F238E27FC236}">
+                <a16:creationId xmlns:a16="http://schemas.microsoft.com/office/drawing/2014/main" id="{AE684EE7-6BFC-451B-9EDF-28B17207DA15}"/>
+              </a:ext>
+            </a:extLst>
+          </p:cNvPr>
+          <p:cNvPicPr>
+            <a:picLocks noChangeAspect="1"/>
+          </p:cNvPicPr>
+          <p:nvPr/>
+        </p:nvPicPr>
+        <p:blipFill>
+          <a:blip r:embed="rId21">
+            <a:extLst>
+              <a:ext uri="{96DAC541-7B7A-43D3-8B79-37D633B846F1}">
+                <asvg:svgBlip xmlns:asvg="http://schemas.microsoft.com/office/drawing/2016/SVG/main" r:embed="rId22"/>
+              </a:ext>
+            </a:extLst>
+          </a:blip>
+          <a:srcRect/>
+          <a:stretch/>
+        </p:blipFill>
+        <p:spPr>
+          <a:xfrm>
+            <a:off x="640080" y="914400"/>
+            <a:ext cx="381000" cy="381000"/>
+          </a:xfrm>
+          <a:prstGeom prst="rect">
+            <a:avLst/>
+          </a:prstGeom>
+        </p:spPr>
+      </p:pic>
     </p:spTree>
     <p:extLst>
       <p:ext uri="{BB962C8B-B14F-4D97-AF65-F5344CB8AC3E}">

</xml_diff>